<commit_message>
Updated presentation with more refined scenario, assumptions and deliverables
</commit_message>
<xml_diff>
--- a/Proposal/Revised Research Proposal - Draft.pptx
+++ b/Proposal/Revised Research Proposal - Draft.pptx
@@ -5,19 +5,20 @@
     <p:sldMasterId id="2147483648" r:id="rId1"/>
   </p:sldMasterIdLst>
   <p:notesMasterIdLst>
-    <p:notesMasterId r:id="rId12"/>
+    <p:notesMasterId r:id="rId13"/>
   </p:notesMasterIdLst>
   <p:sldIdLst>
     <p:sldId id="256" r:id="rId2"/>
     <p:sldId id="257" r:id="rId3"/>
     <p:sldId id="258" r:id="rId4"/>
     <p:sldId id="261" r:id="rId5"/>
-    <p:sldId id="259" r:id="rId6"/>
-    <p:sldId id="260" r:id="rId7"/>
-    <p:sldId id="262" r:id="rId8"/>
-    <p:sldId id="263" r:id="rId9"/>
-    <p:sldId id="265" r:id="rId10"/>
-    <p:sldId id="266" r:id="rId11"/>
+    <p:sldId id="268" r:id="rId6"/>
+    <p:sldId id="267" r:id="rId7"/>
+    <p:sldId id="260" r:id="rId8"/>
+    <p:sldId id="262" r:id="rId9"/>
+    <p:sldId id="263" r:id="rId10"/>
+    <p:sldId id="265" r:id="rId11"/>
+    <p:sldId id="266" r:id="rId12"/>
   </p:sldIdLst>
   <p:sldSz cx="12192000" cy="6858000"/>
   <p:notesSz cx="6858000" cy="9144000"/>
@@ -116,6 +117,11 @@
       </a:defRPr>
     </a:lvl9pPr>
   </p:defaultTextStyle>
+  <p:extLst>
+    <p:ext uri="{EFAFB233-063F-42B5-8137-9DF3F51BA10A}">
+      <p15:sldGuideLst xmlns:p15="http://schemas.microsoft.com/office/powerpoint/2012/main"/>
+    </p:ext>
+  </p:extLst>
 </p:presentation>
 </file>
 
@@ -201,7 +207,7 @@
           <a:p>
             <a:fld id="{8262A69E-B7CB-4A8A-91FF-821C2CAEA518}" type="datetimeFigureOut">
               <a:rPr lang="en-US" smtClean="0"/>
-              <a:t>27-Nov-16</a:t>
+              <a:t>30-Nov-16</a:t>
             </a:fld>
             <a:endParaRPr lang="en-US"/>
           </a:p>
@@ -534,7 +540,7 @@
           <a:p>
             <a:fld id="{4F3A7770-B98B-41F3-8690-184003BE8FCB}" type="slidenum">
               <a:rPr lang="en-US" smtClean="0"/>
-              <a:t>9</a:t>
+              <a:t>10</a:t>
             </a:fld>
             <a:endParaRPr lang="en-US"/>
           </a:p>
@@ -684,7 +690,7 @@
           <a:p>
             <a:fld id="{5AD54CFB-7963-487B-8275-CA919C113671}" type="datetimeFigureOut">
               <a:rPr lang="en-US" smtClean="0"/>
-              <a:t>27-Nov-16</a:t>
+              <a:t>30-Nov-16</a:t>
             </a:fld>
             <a:endParaRPr lang="en-US"/>
           </a:p>
@@ -854,7 +860,7 @@
           <a:p>
             <a:fld id="{5AD54CFB-7963-487B-8275-CA919C113671}" type="datetimeFigureOut">
               <a:rPr lang="en-US" smtClean="0"/>
-              <a:t>27-Nov-16</a:t>
+              <a:t>30-Nov-16</a:t>
             </a:fld>
             <a:endParaRPr lang="en-US"/>
           </a:p>
@@ -1034,7 +1040,7 @@
           <a:p>
             <a:fld id="{5AD54CFB-7963-487B-8275-CA919C113671}" type="datetimeFigureOut">
               <a:rPr lang="en-US" smtClean="0"/>
-              <a:t>27-Nov-16</a:t>
+              <a:t>30-Nov-16</a:t>
             </a:fld>
             <a:endParaRPr lang="en-US"/>
           </a:p>
@@ -1204,7 +1210,7 @@
           <a:p>
             <a:fld id="{5AD54CFB-7963-487B-8275-CA919C113671}" type="datetimeFigureOut">
               <a:rPr lang="en-US" smtClean="0"/>
-              <a:t>27-Nov-16</a:t>
+              <a:t>30-Nov-16</a:t>
             </a:fld>
             <a:endParaRPr lang="en-US"/>
           </a:p>
@@ -1450,7 +1456,7 @@
           <a:p>
             <a:fld id="{5AD54CFB-7963-487B-8275-CA919C113671}" type="datetimeFigureOut">
               <a:rPr lang="en-US" smtClean="0"/>
-              <a:t>27-Nov-16</a:t>
+              <a:t>30-Nov-16</a:t>
             </a:fld>
             <a:endParaRPr lang="en-US"/>
           </a:p>
@@ -1682,7 +1688,7 @@
           <a:p>
             <a:fld id="{5AD54CFB-7963-487B-8275-CA919C113671}" type="datetimeFigureOut">
               <a:rPr lang="en-US" smtClean="0"/>
-              <a:t>27-Nov-16</a:t>
+              <a:t>30-Nov-16</a:t>
             </a:fld>
             <a:endParaRPr lang="en-US"/>
           </a:p>
@@ -2049,7 +2055,7 @@
           <a:p>
             <a:fld id="{5AD54CFB-7963-487B-8275-CA919C113671}" type="datetimeFigureOut">
               <a:rPr lang="en-US" smtClean="0"/>
-              <a:t>27-Nov-16</a:t>
+              <a:t>30-Nov-16</a:t>
             </a:fld>
             <a:endParaRPr lang="en-US"/>
           </a:p>
@@ -2167,7 +2173,7 @@
           <a:p>
             <a:fld id="{5AD54CFB-7963-487B-8275-CA919C113671}" type="datetimeFigureOut">
               <a:rPr lang="en-US" smtClean="0"/>
-              <a:t>27-Nov-16</a:t>
+              <a:t>30-Nov-16</a:t>
             </a:fld>
             <a:endParaRPr lang="en-US"/>
           </a:p>
@@ -2262,7 +2268,7 @@
           <a:p>
             <a:fld id="{5AD54CFB-7963-487B-8275-CA919C113671}" type="datetimeFigureOut">
               <a:rPr lang="en-US" smtClean="0"/>
-              <a:t>27-Nov-16</a:t>
+              <a:t>30-Nov-16</a:t>
             </a:fld>
             <a:endParaRPr lang="en-US"/>
           </a:p>
@@ -2539,7 +2545,7 @@
           <a:p>
             <a:fld id="{5AD54CFB-7963-487B-8275-CA919C113671}" type="datetimeFigureOut">
               <a:rPr lang="en-US" smtClean="0"/>
-              <a:t>27-Nov-16</a:t>
+              <a:t>30-Nov-16</a:t>
             </a:fld>
             <a:endParaRPr lang="en-US"/>
           </a:p>
@@ -2792,7 +2798,7 @@
           <a:p>
             <a:fld id="{5AD54CFB-7963-487B-8275-CA919C113671}" type="datetimeFigureOut">
               <a:rPr lang="en-US" smtClean="0"/>
-              <a:t>27-Nov-16</a:t>
+              <a:t>30-Nov-16</a:t>
             </a:fld>
             <a:endParaRPr lang="en-US"/>
           </a:p>
@@ -3014,7 +3020,7 @@
           <a:p>
             <a:fld id="{5AD54CFB-7963-487B-8275-CA919C113671}" type="datetimeFigureOut">
               <a:rPr lang="en-US" smtClean="0"/>
-              <a:t>27-Nov-16</a:t>
+              <a:t>30-Nov-16</a:t>
             </a:fld>
             <a:endParaRPr lang="en-US"/>
           </a:p>
@@ -3447,8 +3453,19 @@
                 <a:latin typeface="High Tower Text" panose="02040502050506030303" pitchFamily="18" charset="0"/>
                 <a:ea typeface="Roboto" panose="02000000000000000000" pitchFamily="2" charset="0"/>
               </a:rPr>
-              <a:t>CubeSat Constellations: Addressing Multi-Orbit Communication Challenges</a:t>
-            </a:r>
+              <a:t>CubeSat Constellations: </a:t>
+            </a:r>
+            <a:r>
+              <a:rPr lang="en-US" sz="4400" dirty="0" smtClean="0">
+                <a:latin typeface="High Tower Text" panose="02040502050506030303" pitchFamily="18" charset="0"/>
+                <a:ea typeface="Roboto" panose="02000000000000000000" pitchFamily="2" charset="0"/>
+              </a:rPr>
+              <a:t>Maximizing Science Data Volume</a:t>
+            </a:r>
+            <a:endParaRPr lang="en-US" sz="4400" dirty="0" smtClean="0">
+              <a:latin typeface="High Tower Text" panose="02040502050506030303" pitchFamily="18" charset="0"/>
+              <a:ea typeface="Roboto" panose="02000000000000000000" pitchFamily="2" charset="0"/>
+            </a:endParaRPr>
           </a:p>
           <a:p>
             <a:pPr algn="ctr"/>
@@ -3474,7 +3491,21 @@
                 <a:latin typeface="High Tower Text" panose="02040502050506030303" pitchFamily="18" charset="0"/>
                 <a:ea typeface="Roboto" panose="02000000000000000000" pitchFamily="2" charset="0"/>
               </a:rPr>
-              <a:t>Supervised By: Dr. Johnathan Dukes</a:t>
+              <a:t>Supervised By: Dr. </a:t>
+            </a:r>
+            <a:r>
+              <a:rPr lang="en-US" sz="2000" dirty="0" smtClean="0">
+                <a:latin typeface="High Tower Text" panose="02040502050506030303" pitchFamily="18" charset="0"/>
+                <a:ea typeface="Roboto" panose="02000000000000000000" pitchFamily="2" charset="0"/>
+              </a:rPr>
+              <a:t>Jonathan </a:t>
+            </a:r>
+            <a:r>
+              <a:rPr lang="en-US" sz="2000" dirty="0" smtClean="0">
+                <a:latin typeface="High Tower Text" panose="02040502050506030303" pitchFamily="18" charset="0"/>
+                <a:ea typeface="Roboto" panose="02000000000000000000" pitchFamily="2" charset="0"/>
+              </a:rPr>
+              <a:t>Dukes</a:t>
             </a:r>
             <a:endParaRPr lang="en-US" dirty="0">
               <a:latin typeface="High Tower Text" panose="02040502050506030303" pitchFamily="18" charset="0"/>
@@ -3504,6 +3535,418 @@
 </file>
 
 <file path=ppt/slides/slide10.xml><?xml version="1.0" encoding="utf-8"?>
+<p:sld xmlns:a="http://schemas.openxmlformats.org/drawingml/2006/main" xmlns:r="http://schemas.openxmlformats.org/officeDocument/2006/relationships" xmlns:p="http://schemas.openxmlformats.org/presentationml/2006/main">
+  <p:cSld>
+    <p:spTree>
+      <p:nvGrpSpPr>
+        <p:cNvPr id="1" name=""/>
+        <p:cNvGrpSpPr/>
+        <p:nvPr/>
+      </p:nvGrpSpPr>
+      <p:grpSpPr>
+        <a:xfrm>
+          <a:off x="0" y="0"/>
+          <a:ext cx="0" cy="0"/>
+          <a:chOff x="0" y="0"/>
+          <a:chExt cx="0" cy="0"/>
+        </a:xfrm>
+      </p:grpSpPr>
+      <p:sp>
+        <p:nvSpPr>
+          <p:cNvPr id="2" name="Title 1"/>
+          <p:cNvSpPr>
+            <a:spLocks noGrp="1"/>
+          </p:cNvSpPr>
+          <p:nvPr>
+            <p:ph type="title"/>
+          </p:nvPr>
+        </p:nvSpPr>
+        <p:spPr/>
+        <p:txBody>
+          <a:bodyPr/>
+          <a:lstStyle/>
+          <a:p>
+            <a:r>
+              <a:rPr lang="en-US" dirty="0" smtClean="0">
+                <a:latin typeface="High Tower Text" panose="02040502050506030303" pitchFamily="18" charset="0"/>
+              </a:rPr>
+              <a:t>Expected results</a:t>
+            </a:r>
+            <a:endParaRPr lang="en-US" dirty="0">
+              <a:latin typeface="High Tower Text" panose="02040502050506030303" pitchFamily="18" charset="0"/>
+            </a:endParaRPr>
+          </a:p>
+        </p:txBody>
+      </p:sp>
+      <p:sp>
+        <p:nvSpPr>
+          <p:cNvPr id="3" name="Content Placeholder 2"/>
+          <p:cNvSpPr>
+            <a:spLocks noGrp="1"/>
+          </p:cNvSpPr>
+          <p:nvPr>
+            <p:ph idx="1"/>
+          </p:nvPr>
+        </p:nvSpPr>
+        <p:spPr>
+          <a:xfrm>
+            <a:off x="838200" y="1690688"/>
+            <a:ext cx="10515600" cy="4351338"/>
+          </a:xfrm>
+        </p:spPr>
+        <p:txBody>
+          <a:bodyPr/>
+          <a:lstStyle/>
+          <a:p>
+            <a:r>
+              <a:rPr lang="en-US" dirty="0" smtClean="0">
+                <a:latin typeface="High Tower Text" panose="02040502050506030303" pitchFamily="18" charset="0"/>
+              </a:rPr>
+              <a:t>The network simulation will be tested against a number of approaches to </a:t>
+            </a:r>
+            <a:r>
+              <a:rPr lang="en-US" dirty="0" smtClean="0">
+                <a:latin typeface="High Tower Text" panose="02040502050506030303" pitchFamily="18" charset="0"/>
+              </a:rPr>
+              <a:t>maximize science data volume</a:t>
+            </a:r>
+            <a:endParaRPr lang="en-US" dirty="0" smtClean="0">
+              <a:latin typeface="High Tower Text" panose="02040502050506030303" pitchFamily="18" charset="0"/>
+            </a:endParaRPr>
+          </a:p>
+          <a:p>
+            <a:endParaRPr lang="en-US" dirty="0">
+              <a:latin typeface="High Tower Text" panose="02040502050506030303" pitchFamily="18" charset="0"/>
+            </a:endParaRPr>
+          </a:p>
+          <a:p>
+            <a:r>
+              <a:rPr lang="en-US" dirty="0" smtClean="0">
+                <a:latin typeface="High Tower Text" panose="02040502050506030303" pitchFamily="18" charset="0"/>
+              </a:rPr>
+              <a:t>Power hungry high throughput approaches</a:t>
+            </a:r>
+          </a:p>
+          <a:p>
+            <a:r>
+              <a:rPr lang="en-US" dirty="0" smtClean="0">
+                <a:latin typeface="High Tower Text" panose="02040502050506030303" pitchFamily="18" charset="0"/>
+              </a:rPr>
+              <a:t>Avoiding saturation of downlink</a:t>
+            </a:r>
+          </a:p>
+          <a:p>
+            <a:r>
+              <a:rPr lang="en-US" dirty="0" smtClean="0">
+                <a:latin typeface="High Tower Text" panose="02040502050506030303" pitchFamily="18" charset="0"/>
+              </a:rPr>
+              <a:t>Resistance to partition</a:t>
+            </a:r>
+          </a:p>
+          <a:p>
+            <a:endParaRPr lang="en-US" dirty="0" smtClean="0">
+              <a:latin typeface="High Tower Text" panose="02040502050506030303" pitchFamily="18" charset="0"/>
+            </a:endParaRPr>
+          </a:p>
+          <a:p>
+            <a:pPr lvl="1"/>
+            <a:endParaRPr lang="en-US" dirty="0">
+              <a:latin typeface="High Tower Text" panose="02040502050506030303" pitchFamily="18" charset="0"/>
+            </a:endParaRPr>
+          </a:p>
+        </p:txBody>
+      </p:sp>
+    </p:spTree>
+    <p:extLst>
+      <p:ext uri="{BB962C8B-B14F-4D97-AF65-F5344CB8AC3E}">
+        <p14:creationId xmlns:p14="http://schemas.microsoft.com/office/powerpoint/2010/main" val="2516104629"/>
+      </p:ext>
+    </p:extLst>
+  </p:cSld>
+  <p:clrMapOvr>
+    <a:masterClrMapping/>
+  </p:clrMapOvr>
+  <p:timing>
+    <p:tnLst>
+      <p:par>
+        <p:cTn id="1" dur="indefinite" restart="never" nodeType="tmRoot">
+          <p:childTnLst>
+            <p:seq concurrent="1" nextAc="seek">
+              <p:cTn id="2" dur="indefinite" nodeType="mainSeq">
+                <p:childTnLst>
+                  <p:par>
+                    <p:cTn id="3" fill="hold">
+                      <p:stCondLst>
+                        <p:cond delay="indefinite"/>
+                      </p:stCondLst>
+                      <p:childTnLst>
+                        <p:par>
+                          <p:cTn id="4" fill="hold">
+                            <p:stCondLst>
+                              <p:cond delay="0"/>
+                            </p:stCondLst>
+                            <p:childTnLst>
+                              <p:par>
+                                <p:cTn id="5" presetID="10" presetClass="entr" presetSubtype="0" fill="hold" grpId="0" nodeType="clickEffect">
+                                  <p:stCondLst>
+                                    <p:cond delay="0"/>
+                                  </p:stCondLst>
+                                  <p:childTnLst>
+                                    <p:set>
+                                      <p:cBhvr>
+                                        <p:cTn id="6" dur="1" fill="hold">
+                                          <p:stCondLst>
+                                            <p:cond delay="0"/>
+                                          </p:stCondLst>
+                                        </p:cTn>
+                                        <p:tgtEl>
+                                          <p:spTgt spid="3">
+                                            <p:txEl>
+                                              <p:pRg st="0" end="0"/>
+                                            </p:txEl>
+                                          </p:spTgt>
+                                        </p:tgtEl>
+                                        <p:attrNameLst>
+                                          <p:attrName>style.visibility</p:attrName>
+                                        </p:attrNameLst>
+                                      </p:cBhvr>
+                                      <p:to>
+                                        <p:strVal val="visible"/>
+                                      </p:to>
+                                    </p:set>
+                                    <p:animEffect transition="in" filter="fade">
+                                      <p:cBhvr>
+                                        <p:cTn id="7" dur="500"/>
+                                        <p:tgtEl>
+                                          <p:spTgt spid="3">
+                                            <p:txEl>
+                                              <p:pRg st="0" end="0"/>
+                                            </p:txEl>
+                                          </p:spTgt>
+                                        </p:tgtEl>
+                                      </p:cBhvr>
+                                    </p:animEffect>
+                                  </p:childTnLst>
+                                </p:cTn>
+                              </p:par>
+                            </p:childTnLst>
+                          </p:cTn>
+                        </p:par>
+                      </p:childTnLst>
+                    </p:cTn>
+                  </p:par>
+                  <p:par>
+                    <p:cTn id="8" fill="hold">
+                      <p:stCondLst>
+                        <p:cond delay="indefinite"/>
+                      </p:stCondLst>
+                      <p:childTnLst>
+                        <p:par>
+                          <p:cTn id="9" fill="hold">
+                            <p:stCondLst>
+                              <p:cond delay="0"/>
+                            </p:stCondLst>
+                            <p:childTnLst>
+                              <p:par>
+                                <p:cTn id="10" presetID="10" presetClass="entr" presetSubtype="0" fill="hold" grpId="0" nodeType="clickEffect">
+                                  <p:stCondLst>
+                                    <p:cond delay="0"/>
+                                  </p:stCondLst>
+                                  <p:childTnLst>
+                                    <p:set>
+                                      <p:cBhvr>
+                                        <p:cTn id="11" dur="1" fill="hold">
+                                          <p:stCondLst>
+                                            <p:cond delay="0"/>
+                                          </p:stCondLst>
+                                        </p:cTn>
+                                        <p:tgtEl>
+                                          <p:spTgt spid="3">
+                                            <p:txEl>
+                                              <p:pRg st="2" end="2"/>
+                                            </p:txEl>
+                                          </p:spTgt>
+                                        </p:tgtEl>
+                                        <p:attrNameLst>
+                                          <p:attrName>style.visibility</p:attrName>
+                                        </p:attrNameLst>
+                                      </p:cBhvr>
+                                      <p:to>
+                                        <p:strVal val="visible"/>
+                                      </p:to>
+                                    </p:set>
+                                    <p:animEffect transition="in" filter="fade">
+                                      <p:cBhvr>
+                                        <p:cTn id="12" dur="500"/>
+                                        <p:tgtEl>
+                                          <p:spTgt spid="3">
+                                            <p:txEl>
+                                              <p:pRg st="2" end="2"/>
+                                            </p:txEl>
+                                          </p:spTgt>
+                                        </p:tgtEl>
+                                      </p:cBhvr>
+                                    </p:animEffect>
+                                  </p:childTnLst>
+                                </p:cTn>
+                              </p:par>
+                            </p:childTnLst>
+                          </p:cTn>
+                        </p:par>
+                      </p:childTnLst>
+                    </p:cTn>
+                  </p:par>
+                  <p:par>
+                    <p:cTn id="13" fill="hold">
+                      <p:stCondLst>
+                        <p:cond delay="indefinite"/>
+                      </p:stCondLst>
+                      <p:childTnLst>
+                        <p:par>
+                          <p:cTn id="14" fill="hold">
+                            <p:stCondLst>
+                              <p:cond delay="0"/>
+                            </p:stCondLst>
+                            <p:childTnLst>
+                              <p:par>
+                                <p:cTn id="15" presetID="10" presetClass="entr" presetSubtype="0" fill="hold" grpId="0" nodeType="clickEffect">
+                                  <p:stCondLst>
+                                    <p:cond delay="0"/>
+                                  </p:stCondLst>
+                                  <p:childTnLst>
+                                    <p:set>
+                                      <p:cBhvr>
+                                        <p:cTn id="16" dur="1" fill="hold">
+                                          <p:stCondLst>
+                                            <p:cond delay="0"/>
+                                          </p:stCondLst>
+                                        </p:cTn>
+                                        <p:tgtEl>
+                                          <p:spTgt spid="3">
+                                            <p:txEl>
+                                              <p:pRg st="3" end="3"/>
+                                            </p:txEl>
+                                          </p:spTgt>
+                                        </p:tgtEl>
+                                        <p:attrNameLst>
+                                          <p:attrName>style.visibility</p:attrName>
+                                        </p:attrNameLst>
+                                      </p:cBhvr>
+                                      <p:to>
+                                        <p:strVal val="visible"/>
+                                      </p:to>
+                                    </p:set>
+                                    <p:animEffect transition="in" filter="fade">
+                                      <p:cBhvr>
+                                        <p:cTn id="17" dur="500"/>
+                                        <p:tgtEl>
+                                          <p:spTgt spid="3">
+                                            <p:txEl>
+                                              <p:pRg st="3" end="3"/>
+                                            </p:txEl>
+                                          </p:spTgt>
+                                        </p:tgtEl>
+                                      </p:cBhvr>
+                                    </p:animEffect>
+                                  </p:childTnLst>
+                                </p:cTn>
+                              </p:par>
+                            </p:childTnLst>
+                          </p:cTn>
+                        </p:par>
+                      </p:childTnLst>
+                    </p:cTn>
+                  </p:par>
+                  <p:par>
+                    <p:cTn id="18" fill="hold">
+                      <p:stCondLst>
+                        <p:cond delay="indefinite"/>
+                      </p:stCondLst>
+                      <p:childTnLst>
+                        <p:par>
+                          <p:cTn id="19" fill="hold">
+                            <p:stCondLst>
+                              <p:cond delay="0"/>
+                            </p:stCondLst>
+                            <p:childTnLst>
+                              <p:par>
+                                <p:cTn id="20" presetID="10" presetClass="entr" presetSubtype="0" fill="hold" grpId="0" nodeType="clickEffect">
+                                  <p:stCondLst>
+                                    <p:cond delay="0"/>
+                                  </p:stCondLst>
+                                  <p:childTnLst>
+                                    <p:set>
+                                      <p:cBhvr>
+                                        <p:cTn id="21" dur="1" fill="hold">
+                                          <p:stCondLst>
+                                            <p:cond delay="0"/>
+                                          </p:stCondLst>
+                                        </p:cTn>
+                                        <p:tgtEl>
+                                          <p:spTgt spid="3">
+                                            <p:txEl>
+                                              <p:pRg st="4" end="4"/>
+                                            </p:txEl>
+                                          </p:spTgt>
+                                        </p:tgtEl>
+                                        <p:attrNameLst>
+                                          <p:attrName>style.visibility</p:attrName>
+                                        </p:attrNameLst>
+                                      </p:cBhvr>
+                                      <p:to>
+                                        <p:strVal val="visible"/>
+                                      </p:to>
+                                    </p:set>
+                                    <p:animEffect transition="in" filter="fade">
+                                      <p:cBhvr>
+                                        <p:cTn id="22" dur="500"/>
+                                        <p:tgtEl>
+                                          <p:spTgt spid="3">
+                                            <p:txEl>
+                                              <p:pRg st="4" end="4"/>
+                                            </p:txEl>
+                                          </p:spTgt>
+                                        </p:tgtEl>
+                                      </p:cBhvr>
+                                    </p:animEffect>
+                                  </p:childTnLst>
+                                </p:cTn>
+                              </p:par>
+                            </p:childTnLst>
+                          </p:cTn>
+                        </p:par>
+                      </p:childTnLst>
+                    </p:cTn>
+                  </p:par>
+                </p:childTnLst>
+              </p:cTn>
+              <p:prevCondLst>
+                <p:cond evt="onPrev" delay="0">
+                  <p:tgtEl>
+                    <p:sldTgt/>
+                  </p:tgtEl>
+                </p:cond>
+              </p:prevCondLst>
+              <p:nextCondLst>
+                <p:cond evt="onNext" delay="0">
+                  <p:tgtEl>
+                    <p:sldTgt/>
+                  </p:tgtEl>
+                </p:cond>
+              </p:nextCondLst>
+            </p:seq>
+          </p:childTnLst>
+        </p:cTn>
+      </p:par>
+    </p:tnLst>
+    <p:bldLst>
+      <p:bldP spid="3" grpId="0" build="p"/>
+    </p:bldLst>
+  </p:timing>
+</p:sld>
+</file>
+
+<file path=ppt/slides/slide11.xml><?xml version="1.0" encoding="utf-8"?>
 <p:sld xmlns:a="http://schemas.openxmlformats.org/drawingml/2006/main" xmlns:r="http://schemas.openxmlformats.org/officeDocument/2006/relationships" xmlns:p="http://schemas.openxmlformats.org/presentationml/2006/main">
   <p:cSld>
     <p:spTree>
@@ -3621,7 +4064,83 @@
   <p:timing>
     <p:tnLst>
       <p:par>
-        <p:cTn id="1" dur="indefinite" restart="never" nodeType="tmRoot"/>
+        <p:cTn id="1" dur="indefinite" restart="never" nodeType="tmRoot">
+          <p:childTnLst>
+            <p:seq concurrent="1" nextAc="seek">
+              <p:cTn id="2" dur="indefinite" nodeType="mainSeq">
+                <p:childTnLst>
+                  <p:par>
+                    <p:cTn id="3" fill="hold">
+                      <p:stCondLst>
+                        <p:cond delay="indefinite"/>
+                      </p:stCondLst>
+                      <p:childTnLst>
+                        <p:par>
+                          <p:cTn id="4" fill="hold">
+                            <p:stCondLst>
+                              <p:cond delay="0"/>
+                            </p:stCondLst>
+                            <p:childTnLst>
+                              <p:par>
+                                <p:cTn id="5" presetID="10" presetClass="entr" presetSubtype="0" fill="hold" nodeType="clickEffect">
+                                  <p:stCondLst>
+                                    <p:cond delay="0"/>
+                                  </p:stCondLst>
+                                  <p:childTnLst>
+                                    <p:set>
+                                      <p:cBhvr>
+                                        <p:cTn id="6" dur="1" fill="hold">
+                                          <p:stCondLst>
+                                            <p:cond delay="0"/>
+                                          </p:stCondLst>
+                                        </p:cTn>
+                                        <p:tgtEl>
+                                          <p:spTgt spid="5"/>
+                                        </p:tgtEl>
+                                        <p:attrNameLst>
+                                          <p:attrName>style.visibility</p:attrName>
+                                        </p:attrNameLst>
+                                      </p:cBhvr>
+                                      <p:to>
+                                        <p:strVal val="visible"/>
+                                      </p:to>
+                                    </p:set>
+                                    <p:animEffect transition="in" filter="fade">
+                                      <p:cBhvr>
+                                        <p:cTn id="7" dur="500"/>
+                                        <p:tgtEl>
+                                          <p:spTgt spid="5"/>
+                                        </p:tgtEl>
+                                      </p:cBhvr>
+                                    </p:animEffect>
+                                  </p:childTnLst>
+                                </p:cTn>
+                              </p:par>
+                            </p:childTnLst>
+                          </p:cTn>
+                        </p:par>
+                      </p:childTnLst>
+                    </p:cTn>
+                  </p:par>
+                </p:childTnLst>
+              </p:cTn>
+              <p:prevCondLst>
+                <p:cond evt="onPrev" delay="0">
+                  <p:tgtEl>
+                    <p:sldTgt/>
+                  </p:tgtEl>
+                </p:cond>
+              </p:prevCondLst>
+              <p:nextCondLst>
+                <p:cond evt="onNext" delay="0">
+                  <p:tgtEl>
+                    <p:sldTgt/>
+                  </p:tgtEl>
+                </p:cond>
+              </p:nextCondLst>
+            </p:seq>
+          </p:childTnLst>
+        </p:cTn>
       </p:par>
     </p:tnLst>
   </p:timing>
@@ -3958,41 +4477,36 @@
               <a:rPr lang="en-US" dirty="0" smtClean="0">
                 <a:latin typeface="High Tower Text" panose="02040502050506030303" pitchFamily="18" charset="0"/>
               </a:rPr>
-              <a:t>Extensive use of commercial of the shelf hardware</a:t>
-            </a:r>
-          </a:p>
-          <a:p>
+              <a:t>Extensive use of commercial of the shelf </a:t>
+            </a:r>
+            <a:r>
+              <a:rPr lang="en-US" dirty="0">
+                <a:latin typeface="High Tower Text" panose="02040502050506030303" pitchFamily="18" charset="0"/>
+              </a:rPr>
+              <a:t>hardware</a:t>
+            </a:r>
+          </a:p>
+          <a:p>
+            <a:r>
+              <a:rPr lang="en-US" dirty="0">
+                <a:latin typeface="High Tower Text" panose="02040502050506030303" pitchFamily="18" charset="0"/>
+              </a:rPr>
+              <a:t>Low earth orbit 160-2000km (</a:t>
+            </a:r>
+            <a:r>
+              <a:rPr lang="en-US" dirty="0">
+                <a:solidFill>
+                  <a:srgbClr val="00B0F0"/>
+                </a:solidFill>
+                <a:latin typeface="High Tower Text" panose="02040502050506030303" pitchFamily="18" charset="0"/>
+              </a:rPr>
+              <a:t>~500km</a:t>
+            </a:r>
             <a:r>
               <a:rPr lang="en-US" dirty="0" smtClean="0">
                 <a:latin typeface="High Tower Text" panose="02040502050506030303" pitchFamily="18" charset="0"/>
               </a:rPr>
-              <a:t>Typically max communication power of </a:t>
-            </a:r>
-            <a:r>
-              <a:rPr lang="en-US" dirty="0" smtClean="0">
-                <a:solidFill>
-                  <a:srgbClr val="00B0F0"/>
-                </a:solidFill>
-                <a:latin typeface="High Tower Text" panose="02040502050506030303" pitchFamily="18" charset="0"/>
-              </a:rPr>
-              <a:t>2 watts</a:t>
-            </a:r>
-          </a:p>
-          <a:p>
-            <a:r>
-              <a:rPr lang="en-US" dirty="0" smtClean="0">
-                <a:latin typeface="High Tower Text" panose="02040502050506030303" pitchFamily="18" charset="0"/>
-              </a:rPr>
-              <a:t>Typical one unit batteries supply </a:t>
-            </a:r>
-            <a:r>
-              <a:rPr lang="en-US" dirty="0" smtClean="0">
-                <a:solidFill>
-                  <a:srgbClr val="00B0F0"/>
-                </a:solidFill>
-                <a:latin typeface="High Tower Text" panose="02040502050506030303" pitchFamily="18" charset="0"/>
-              </a:rPr>
-              <a:t>25 to 50 watt hours</a:t>
+              <a:t>)</a:t>
             </a:r>
             <a:endParaRPr lang="en-US" dirty="0" smtClean="0">
               <a:latin typeface="High Tower Text" panose="02040502050506030303" pitchFamily="18" charset="0"/>
@@ -4003,15 +4517,13 @@
               <a:rPr lang="en-US" dirty="0" smtClean="0">
                 <a:latin typeface="High Tower Text" panose="02040502050506030303" pitchFamily="18" charset="0"/>
               </a:rPr>
-              <a:t>Currently about $75,000 for construction and launch</a:t>
-            </a:r>
-          </a:p>
-          <a:p>
+              <a:t>Typical </a:t>
+            </a:r>
             <a:r>
               <a:rPr lang="en-US" dirty="0" smtClean="0">
                 <a:latin typeface="High Tower Text" panose="02040502050506030303" pitchFamily="18" charset="0"/>
               </a:rPr>
-              <a:t>Low earth orbit 160-2000km (</a:t>
+              <a:t>one unit batteries supply </a:t>
             </a:r>
             <a:r>
               <a:rPr lang="en-US" dirty="0" smtClean="0">
@@ -4020,16 +4532,51 @@
                 </a:solidFill>
                 <a:latin typeface="High Tower Text" panose="02040502050506030303" pitchFamily="18" charset="0"/>
               </a:rPr>
-              <a:t>~500km</a:t>
+              <a:t>25 to 50 watt </a:t>
             </a:r>
             <a:r>
               <a:rPr lang="en-US" dirty="0" smtClean="0">
-                <a:latin typeface="High Tower Text" panose="02040502050506030303" pitchFamily="18" charset="0"/>
-              </a:rPr>
-              <a:t>)</a:t>
-            </a:r>
-          </a:p>
-          <a:p>
+                <a:solidFill>
+                  <a:srgbClr val="00B0F0"/>
+                </a:solidFill>
+                <a:latin typeface="High Tower Text" panose="02040502050506030303" pitchFamily="18" charset="0"/>
+              </a:rPr>
+              <a:t>hours</a:t>
+            </a:r>
+          </a:p>
+          <a:p>
+            <a:r>
+              <a:rPr lang="en-US" dirty="0" smtClean="0">
+                <a:latin typeface="High Tower Text" panose="02040502050506030303" pitchFamily="18" charset="0"/>
+              </a:rPr>
+              <a:t>Communications:</a:t>
+            </a:r>
+            <a:r>
+              <a:rPr lang="en-US" dirty="0" smtClean="0">
+                <a:solidFill>
+                  <a:srgbClr val="00B0F0"/>
+                </a:solidFill>
+                <a:latin typeface="High Tower Text" panose="02040502050506030303" pitchFamily="18" charset="0"/>
+              </a:rPr>
+              <a:t> 1w crosslink 4w downlink</a:t>
+            </a:r>
+            <a:endParaRPr lang="en-US" dirty="0" smtClean="0">
+              <a:latin typeface="High Tower Text" panose="02040502050506030303" pitchFamily="18" charset="0"/>
+            </a:endParaRPr>
+          </a:p>
+          <a:p>
+            <a:r>
+              <a:rPr lang="en-US" dirty="0" smtClean="0">
+                <a:latin typeface="High Tower Text" panose="02040502050506030303" pitchFamily="18" charset="0"/>
+              </a:rPr>
+              <a:t>Currently about $75,000 for construction and </a:t>
+            </a:r>
+            <a:r>
+              <a:rPr lang="en-US" dirty="0" smtClean="0">
+                <a:latin typeface="High Tower Text" panose="02040502050506030303" pitchFamily="18" charset="0"/>
+              </a:rPr>
+              <a:t>launch</a:t>
+            </a:r>
             <a:endParaRPr lang="en-US" dirty="0">
               <a:latin typeface="High Tower Text" panose="02040502050506030303" pitchFamily="18" charset="0"/>
             </a:endParaRPr>
@@ -6093,7 +6640,7 @@
       </p:par>
     </p:tnLst>
     <p:bldLst>
-      <p:bldP spid="7" grpId="0" build="p"/>
+      <p:bldP spid="7" grpId="0" uiExpand="1" build="p"/>
     </p:bldLst>
   </p:timing>
 </p:sld>
@@ -6135,7 +6682,7 @@
               <a:rPr lang="en-US" dirty="0" smtClean="0">
                 <a:latin typeface="High Tower Text" panose="02040502050506030303" pitchFamily="18" charset="0"/>
               </a:rPr>
-              <a:t>Propagation challenge</a:t>
+              <a:t>Scenario: Objective</a:t>
             </a:r>
             <a:endParaRPr lang="en-US" dirty="0">
               <a:latin typeface="High Tower Text" panose="02040502050506030303" pitchFamily="18" charset="0"/>
@@ -6145,7 +6692,7 @@
       </p:sp>
       <p:sp>
         <p:nvSpPr>
-          <p:cNvPr id="5" name="Content Placeholder 2"/>
+          <p:cNvPr id="7" name="Content Placeholder 2"/>
           <p:cNvSpPr txBox="1">
             <a:spLocks/>
           </p:cNvSpPr>
@@ -6153,7 +6700,7 @@
         </p:nvSpPr>
         <p:spPr>
           <a:xfrm>
-            <a:off x="838200" y="1690688"/>
+            <a:off x="838200" y="1701009"/>
             <a:ext cx="10515600" cy="4351338"/>
           </a:xfrm>
           <a:prstGeom prst="rect">
@@ -6333,24 +6880,42 @@
               <a:rPr lang="en-US" dirty="0" smtClean="0">
                 <a:latin typeface="High Tower Text" panose="02040502050506030303" pitchFamily="18" charset="0"/>
               </a:rPr>
-              <a:t>Unless the constellation is very large or restrained to particular orbits </a:t>
-            </a:r>
+              <a:t>Science!</a:t>
+            </a:r>
+          </a:p>
+          <a:p>
             <a:r>
               <a:rPr lang="en-US" dirty="0" smtClean="0">
+                <a:latin typeface="High Tower Text" panose="02040502050506030303" pitchFamily="18" charset="0"/>
+              </a:rPr>
+              <a:t>Maximize the amount of collected science data</a:t>
+            </a:r>
+          </a:p>
+          <a:p>
+            <a:pPr lvl="1"/>
+            <a:r>
+              <a:rPr lang="en-US" dirty="0" smtClean="0">
+                <a:latin typeface="High Tower Text" panose="02040502050506030303" pitchFamily="18" charset="0"/>
+              </a:rPr>
+              <a:t>Maximize </a:t>
+            </a:r>
+            <a:r>
+              <a:rPr lang="en-US" dirty="0" smtClean="0">
                 <a:solidFill>
                   <a:srgbClr val="00B0F0"/>
                 </a:solidFill>
                 <a:latin typeface="High Tower Text" panose="02040502050506030303" pitchFamily="18" charset="0"/>
               </a:rPr>
-              <a:t>ground station will only be ‘in-view’ for short periods</a:t>
-            </a:r>
-          </a:p>
-          <a:p>
+              <a:t>downlink throughput</a:t>
+            </a:r>
+          </a:p>
+          <a:p>
+            <a:pPr lvl="1"/>
             <a:r>
               <a:rPr lang="en-US" dirty="0" smtClean="0">
                 <a:latin typeface="High Tower Text" panose="02040502050506030303" pitchFamily="18" charset="0"/>
               </a:rPr>
-              <a:t>How can command and control data be assured to                                 </a:t>
+              <a:t>Maximize average CubeSat power -&gt; Maximize </a:t>
             </a:r>
             <a:r>
               <a:rPr lang="en-US" dirty="0" smtClean="0">
@@ -6359,13 +6924,13 @@
                 </a:solidFill>
                 <a:latin typeface="High Tower Text" panose="02040502050506030303" pitchFamily="18" charset="0"/>
               </a:rPr>
-              <a:t>reach the required CubeSats</a:t>
+              <a:t>science data collected </a:t>
             </a:r>
             <a:r>
               <a:rPr lang="en-US" dirty="0" smtClean="0">
                 <a:latin typeface="High Tower Text" panose="02040502050506030303" pitchFamily="18" charset="0"/>
               </a:rPr>
-              <a:t>?</a:t>
+              <a:t>within mission lifetime</a:t>
             </a:r>
           </a:p>
           <a:p>
@@ -6373,7 +6938,7 @@
               <a:rPr lang="en-US" dirty="0" smtClean="0">
                 <a:latin typeface="High Tower Text" panose="02040502050506030303" pitchFamily="18" charset="0"/>
               </a:rPr>
-              <a:t>CubeSats will experience </a:t>
+              <a:t>Sending data to ground (downlink) is </a:t>
             </a:r>
             <a:r>
               <a:rPr lang="en-US" dirty="0" smtClean="0">
@@ -6382,15 +6947,13 @@
                 </a:solidFill>
                 <a:latin typeface="High Tower Text" panose="02040502050506030303" pitchFamily="18" charset="0"/>
               </a:rPr>
-              <a:t>in-orbit and inter-orbit drift</a:t>
-            </a:r>
-          </a:p>
-          <a:p>
+              <a:t>more expensive than sending data between nodes</a:t>
+            </a:r>
             <a:r>
               <a:rPr lang="en-US" dirty="0" smtClean="0">
                 <a:latin typeface="High Tower Text" panose="02040502050506030303" pitchFamily="18" charset="0"/>
               </a:rPr>
-              <a:t>CubeSats in an adjacent orbit may be unreachable</a:t>
+              <a:t> (crosslink)</a:t>
             </a:r>
           </a:p>
           <a:p>
@@ -6398,30 +6961,21 @@
               <a:rPr lang="en-US" dirty="0" smtClean="0">
                 <a:latin typeface="High Tower Text" panose="02040502050506030303" pitchFamily="18" charset="0"/>
               </a:rPr>
-              <a:t>Available </a:t>
-            </a:r>
-            <a:r>
-              <a:rPr lang="en-US" dirty="0" smtClean="0">
-                <a:solidFill>
-                  <a:srgbClr val="00B0F0"/>
-                </a:solidFill>
-                <a:latin typeface="High Tower Text" panose="02040502050506030303" pitchFamily="18" charset="0"/>
-              </a:rPr>
-              <a:t>power is the key limiting factor </a:t>
+              <a:t>Opportunities to downlink are within fixed periods</a:t>
             </a:r>
           </a:p>
         </p:txBody>
       </p:sp>
       <p:pic>
         <p:nvPicPr>
-          <p:cNvPr id="7" name="Content Placeholder 3"/>
+          <p:cNvPr id="3" name="Picture 2"/>
           <p:cNvPicPr>
             <a:picLocks noChangeAspect="1"/>
           </p:cNvPicPr>
           <p:nvPr/>
         </p:nvPicPr>
         <p:blipFill>
-          <a:blip r:embed="rId2">
+          <a:blip r:embed="rId2" cstate="print">
             <a:extLst>
               <a:ext uri="{28A0092B-C50C-407E-A947-70E740481C1C}">
                 <a14:useLocalDpi xmlns:a14="http://schemas.microsoft.com/office/drawing/2010/main" val="0"/>
@@ -6434,8 +6988,8 @@
         </p:blipFill>
         <p:spPr>
           <a:xfrm>
-            <a:off x="8865423" y="2517260"/>
-            <a:ext cx="2762250" cy="2505075"/>
+            <a:off x="8527642" y="295991"/>
+            <a:ext cx="3286988" cy="1168273"/>
           </a:xfrm>
           <a:prstGeom prst="rect">
             <a:avLst/>
@@ -6445,7 +6999,7 @@
     </p:spTree>
     <p:extLst>
       <p:ext uri="{BB962C8B-B14F-4D97-AF65-F5344CB8AC3E}">
-        <p14:creationId xmlns:p14="http://schemas.microsoft.com/office/powerpoint/2010/main" val="3255485093"/>
+        <p14:creationId xmlns:p14="http://schemas.microsoft.com/office/powerpoint/2010/main" val="3353626928"/>
       </p:ext>
     </p:extLst>
   </p:cSld>
@@ -6455,14 +7009,1479 @@
   <p:timing>
     <p:tnLst>
       <p:par>
-        <p:cTn id="1" dur="indefinite" restart="never" nodeType="tmRoot"/>
+        <p:cTn id="1" dur="indefinite" restart="never" nodeType="tmRoot">
+          <p:childTnLst>
+            <p:seq concurrent="1" nextAc="seek">
+              <p:cTn id="2" dur="indefinite" nodeType="mainSeq">
+                <p:childTnLst>
+                  <p:par>
+                    <p:cTn id="3" fill="hold">
+                      <p:stCondLst>
+                        <p:cond delay="indefinite"/>
+                      </p:stCondLst>
+                      <p:childTnLst>
+                        <p:par>
+                          <p:cTn id="4" fill="hold">
+                            <p:stCondLst>
+                              <p:cond delay="0"/>
+                            </p:stCondLst>
+                            <p:childTnLst>
+                              <p:par>
+                                <p:cTn id="5" presetID="10" presetClass="entr" presetSubtype="0" fill="hold" grpId="0" nodeType="clickEffect">
+                                  <p:stCondLst>
+                                    <p:cond delay="0"/>
+                                  </p:stCondLst>
+                                  <p:childTnLst>
+                                    <p:set>
+                                      <p:cBhvr>
+                                        <p:cTn id="6" dur="1" fill="hold">
+                                          <p:stCondLst>
+                                            <p:cond delay="0"/>
+                                          </p:stCondLst>
+                                        </p:cTn>
+                                        <p:tgtEl>
+                                          <p:spTgt spid="7">
+                                            <p:txEl>
+                                              <p:pRg st="0" end="0"/>
+                                            </p:txEl>
+                                          </p:spTgt>
+                                        </p:tgtEl>
+                                        <p:attrNameLst>
+                                          <p:attrName>style.visibility</p:attrName>
+                                        </p:attrNameLst>
+                                      </p:cBhvr>
+                                      <p:to>
+                                        <p:strVal val="visible"/>
+                                      </p:to>
+                                    </p:set>
+                                    <p:animEffect transition="in" filter="fade">
+                                      <p:cBhvr>
+                                        <p:cTn id="7" dur="500"/>
+                                        <p:tgtEl>
+                                          <p:spTgt spid="7">
+                                            <p:txEl>
+                                              <p:pRg st="0" end="0"/>
+                                            </p:txEl>
+                                          </p:spTgt>
+                                        </p:tgtEl>
+                                      </p:cBhvr>
+                                    </p:animEffect>
+                                  </p:childTnLst>
+                                </p:cTn>
+                              </p:par>
+                              <p:par>
+                                <p:cTn id="8" presetID="26" presetClass="entr" presetSubtype="0" fill="hold" nodeType="withEffect">
+                                  <p:stCondLst>
+                                    <p:cond delay="0"/>
+                                  </p:stCondLst>
+                                  <p:childTnLst>
+                                    <p:set>
+                                      <p:cBhvr>
+                                        <p:cTn id="9" dur="1" fill="hold">
+                                          <p:stCondLst>
+                                            <p:cond delay="0"/>
+                                          </p:stCondLst>
+                                        </p:cTn>
+                                        <p:tgtEl>
+                                          <p:spTgt spid="3"/>
+                                        </p:tgtEl>
+                                        <p:attrNameLst>
+                                          <p:attrName>style.visibility</p:attrName>
+                                        </p:attrNameLst>
+                                      </p:cBhvr>
+                                      <p:to>
+                                        <p:strVal val="visible"/>
+                                      </p:to>
+                                    </p:set>
+                                    <p:animEffect transition="in" filter="wipe(down)">
+                                      <p:cBhvr>
+                                        <p:cTn id="10" dur="580">
+                                          <p:stCondLst>
+                                            <p:cond delay="0"/>
+                                          </p:stCondLst>
+                                        </p:cTn>
+                                        <p:tgtEl>
+                                          <p:spTgt spid="3"/>
+                                        </p:tgtEl>
+                                      </p:cBhvr>
+                                    </p:animEffect>
+                                    <p:anim calcmode="lin" valueType="num">
+                                      <p:cBhvr>
+                                        <p:cTn id="11" dur="1822" tmFilter="0,0; 0.14,0.36; 0.43,0.73; 0.71,0.91; 1.0,1.0">
+                                          <p:stCondLst>
+                                            <p:cond delay="0"/>
+                                          </p:stCondLst>
+                                        </p:cTn>
+                                        <p:tgtEl>
+                                          <p:spTgt spid="3"/>
+                                        </p:tgtEl>
+                                        <p:attrNameLst>
+                                          <p:attrName>ppt_x</p:attrName>
+                                        </p:attrNameLst>
+                                      </p:cBhvr>
+                                      <p:tavLst>
+                                        <p:tav tm="0">
+                                          <p:val>
+                                            <p:strVal val="#ppt_x-0.25"/>
+                                          </p:val>
+                                        </p:tav>
+                                        <p:tav tm="100000">
+                                          <p:val>
+                                            <p:strVal val="#ppt_x"/>
+                                          </p:val>
+                                        </p:tav>
+                                      </p:tavLst>
+                                    </p:anim>
+                                    <p:anim calcmode="lin" valueType="num">
+                                      <p:cBhvr>
+                                        <p:cTn id="12" dur="664" tmFilter="0.0,0.0; 0.25,0.07; 0.50,0.2; 0.75,0.467; 1.0,1.0">
+                                          <p:stCondLst>
+                                            <p:cond delay="0"/>
+                                          </p:stCondLst>
+                                        </p:cTn>
+                                        <p:tgtEl>
+                                          <p:spTgt spid="3"/>
+                                        </p:tgtEl>
+                                        <p:attrNameLst>
+                                          <p:attrName>ppt_y</p:attrName>
+                                        </p:attrNameLst>
+                                      </p:cBhvr>
+                                      <p:tavLst>
+                                        <p:tav tm="0" fmla="#ppt_y-sin(pi*$)/3">
+                                          <p:val>
+                                            <p:fltVal val="0.5"/>
+                                          </p:val>
+                                        </p:tav>
+                                        <p:tav tm="100000">
+                                          <p:val>
+                                            <p:fltVal val="1"/>
+                                          </p:val>
+                                        </p:tav>
+                                      </p:tavLst>
+                                    </p:anim>
+                                    <p:anim calcmode="lin" valueType="num">
+                                      <p:cBhvr>
+                                        <p:cTn id="13" dur="664" tmFilter="0, 0; 0.125,0.2665; 0.25,0.4; 0.375,0.465; 0.5,0.5;  0.625,0.535; 0.75,0.6; 0.875,0.7335; 1,1">
+                                          <p:stCondLst>
+                                            <p:cond delay="664"/>
+                                          </p:stCondLst>
+                                        </p:cTn>
+                                        <p:tgtEl>
+                                          <p:spTgt spid="3"/>
+                                        </p:tgtEl>
+                                        <p:attrNameLst>
+                                          <p:attrName>ppt_y</p:attrName>
+                                        </p:attrNameLst>
+                                      </p:cBhvr>
+                                      <p:tavLst>
+                                        <p:tav tm="0" fmla="#ppt_y-sin(pi*$)/9">
+                                          <p:val>
+                                            <p:fltVal val="0"/>
+                                          </p:val>
+                                        </p:tav>
+                                        <p:tav tm="100000">
+                                          <p:val>
+                                            <p:fltVal val="1"/>
+                                          </p:val>
+                                        </p:tav>
+                                      </p:tavLst>
+                                    </p:anim>
+                                    <p:anim calcmode="lin" valueType="num">
+                                      <p:cBhvr>
+                                        <p:cTn id="14" dur="332" tmFilter="0, 0; 0.125,0.2665; 0.25,0.4; 0.375,0.465; 0.5,0.5;  0.625,0.535; 0.75,0.6; 0.875,0.7335; 1,1">
+                                          <p:stCondLst>
+                                            <p:cond delay="1324"/>
+                                          </p:stCondLst>
+                                        </p:cTn>
+                                        <p:tgtEl>
+                                          <p:spTgt spid="3"/>
+                                        </p:tgtEl>
+                                        <p:attrNameLst>
+                                          <p:attrName>ppt_y</p:attrName>
+                                        </p:attrNameLst>
+                                      </p:cBhvr>
+                                      <p:tavLst>
+                                        <p:tav tm="0" fmla="#ppt_y-sin(pi*$)/27">
+                                          <p:val>
+                                            <p:fltVal val="0"/>
+                                          </p:val>
+                                        </p:tav>
+                                        <p:tav tm="100000">
+                                          <p:val>
+                                            <p:fltVal val="1"/>
+                                          </p:val>
+                                        </p:tav>
+                                      </p:tavLst>
+                                    </p:anim>
+                                    <p:anim calcmode="lin" valueType="num">
+                                      <p:cBhvr>
+                                        <p:cTn id="15" dur="164" tmFilter="0, 0; 0.125,0.2665; 0.25,0.4; 0.375,0.465; 0.5,0.5;  0.625,0.535; 0.75,0.6; 0.875,0.7335; 1,1">
+                                          <p:stCondLst>
+                                            <p:cond delay="1656"/>
+                                          </p:stCondLst>
+                                        </p:cTn>
+                                        <p:tgtEl>
+                                          <p:spTgt spid="3"/>
+                                        </p:tgtEl>
+                                        <p:attrNameLst>
+                                          <p:attrName>ppt_y</p:attrName>
+                                        </p:attrNameLst>
+                                      </p:cBhvr>
+                                      <p:tavLst>
+                                        <p:tav tm="0" fmla="#ppt_y-sin(pi*$)/81">
+                                          <p:val>
+                                            <p:fltVal val="0"/>
+                                          </p:val>
+                                        </p:tav>
+                                        <p:tav tm="100000">
+                                          <p:val>
+                                            <p:fltVal val="1"/>
+                                          </p:val>
+                                        </p:tav>
+                                      </p:tavLst>
+                                    </p:anim>
+                                    <p:animScale>
+                                      <p:cBhvr>
+                                        <p:cTn id="16" dur="26">
+                                          <p:stCondLst>
+                                            <p:cond delay="650"/>
+                                          </p:stCondLst>
+                                        </p:cTn>
+                                        <p:tgtEl>
+                                          <p:spTgt spid="3"/>
+                                        </p:tgtEl>
+                                      </p:cBhvr>
+                                      <p:to x="100000" y="60000"/>
+                                    </p:animScale>
+                                    <p:animScale>
+                                      <p:cBhvr>
+                                        <p:cTn id="17" dur="166" decel="50000">
+                                          <p:stCondLst>
+                                            <p:cond delay="676"/>
+                                          </p:stCondLst>
+                                        </p:cTn>
+                                        <p:tgtEl>
+                                          <p:spTgt spid="3"/>
+                                        </p:tgtEl>
+                                      </p:cBhvr>
+                                      <p:to x="100000" y="100000"/>
+                                    </p:animScale>
+                                    <p:animScale>
+                                      <p:cBhvr>
+                                        <p:cTn id="18" dur="26">
+                                          <p:stCondLst>
+                                            <p:cond delay="1312"/>
+                                          </p:stCondLst>
+                                        </p:cTn>
+                                        <p:tgtEl>
+                                          <p:spTgt spid="3"/>
+                                        </p:tgtEl>
+                                      </p:cBhvr>
+                                      <p:to x="100000" y="80000"/>
+                                    </p:animScale>
+                                    <p:animScale>
+                                      <p:cBhvr>
+                                        <p:cTn id="19" dur="166" decel="50000">
+                                          <p:stCondLst>
+                                            <p:cond delay="1338"/>
+                                          </p:stCondLst>
+                                        </p:cTn>
+                                        <p:tgtEl>
+                                          <p:spTgt spid="3"/>
+                                        </p:tgtEl>
+                                      </p:cBhvr>
+                                      <p:to x="100000" y="100000"/>
+                                    </p:animScale>
+                                    <p:animScale>
+                                      <p:cBhvr>
+                                        <p:cTn id="20" dur="26">
+                                          <p:stCondLst>
+                                            <p:cond delay="1642"/>
+                                          </p:stCondLst>
+                                        </p:cTn>
+                                        <p:tgtEl>
+                                          <p:spTgt spid="3"/>
+                                        </p:tgtEl>
+                                      </p:cBhvr>
+                                      <p:to x="100000" y="90000"/>
+                                    </p:animScale>
+                                    <p:animScale>
+                                      <p:cBhvr>
+                                        <p:cTn id="21" dur="166" decel="50000">
+                                          <p:stCondLst>
+                                            <p:cond delay="1668"/>
+                                          </p:stCondLst>
+                                        </p:cTn>
+                                        <p:tgtEl>
+                                          <p:spTgt spid="3"/>
+                                        </p:tgtEl>
+                                      </p:cBhvr>
+                                      <p:to x="100000" y="100000"/>
+                                    </p:animScale>
+                                    <p:animScale>
+                                      <p:cBhvr>
+                                        <p:cTn id="22" dur="26">
+                                          <p:stCondLst>
+                                            <p:cond delay="1808"/>
+                                          </p:stCondLst>
+                                        </p:cTn>
+                                        <p:tgtEl>
+                                          <p:spTgt spid="3"/>
+                                        </p:tgtEl>
+                                      </p:cBhvr>
+                                      <p:to x="100000" y="95000"/>
+                                    </p:animScale>
+                                    <p:animScale>
+                                      <p:cBhvr>
+                                        <p:cTn id="23" dur="166" decel="50000">
+                                          <p:stCondLst>
+                                            <p:cond delay="1834"/>
+                                          </p:stCondLst>
+                                        </p:cTn>
+                                        <p:tgtEl>
+                                          <p:spTgt spid="3"/>
+                                        </p:tgtEl>
+                                      </p:cBhvr>
+                                      <p:to x="100000" y="100000"/>
+                                    </p:animScale>
+                                  </p:childTnLst>
+                                </p:cTn>
+                              </p:par>
+                            </p:childTnLst>
+                          </p:cTn>
+                        </p:par>
+                      </p:childTnLst>
+                    </p:cTn>
+                  </p:par>
+                  <p:par>
+                    <p:cTn id="24" fill="hold">
+                      <p:stCondLst>
+                        <p:cond delay="indefinite"/>
+                      </p:stCondLst>
+                      <p:childTnLst>
+                        <p:par>
+                          <p:cTn id="25" fill="hold">
+                            <p:stCondLst>
+                              <p:cond delay="0"/>
+                            </p:stCondLst>
+                            <p:childTnLst>
+                              <p:par>
+                                <p:cTn id="26" presetID="10" presetClass="entr" presetSubtype="0" fill="hold" grpId="0" nodeType="clickEffect">
+                                  <p:stCondLst>
+                                    <p:cond delay="0"/>
+                                  </p:stCondLst>
+                                  <p:childTnLst>
+                                    <p:set>
+                                      <p:cBhvr>
+                                        <p:cTn id="27" dur="1" fill="hold">
+                                          <p:stCondLst>
+                                            <p:cond delay="0"/>
+                                          </p:stCondLst>
+                                        </p:cTn>
+                                        <p:tgtEl>
+                                          <p:spTgt spid="7">
+                                            <p:txEl>
+                                              <p:pRg st="1" end="1"/>
+                                            </p:txEl>
+                                          </p:spTgt>
+                                        </p:tgtEl>
+                                        <p:attrNameLst>
+                                          <p:attrName>style.visibility</p:attrName>
+                                        </p:attrNameLst>
+                                      </p:cBhvr>
+                                      <p:to>
+                                        <p:strVal val="visible"/>
+                                      </p:to>
+                                    </p:set>
+                                    <p:animEffect transition="in" filter="fade">
+                                      <p:cBhvr>
+                                        <p:cTn id="28" dur="500"/>
+                                        <p:tgtEl>
+                                          <p:spTgt spid="7">
+                                            <p:txEl>
+                                              <p:pRg st="1" end="1"/>
+                                            </p:txEl>
+                                          </p:spTgt>
+                                        </p:tgtEl>
+                                      </p:cBhvr>
+                                    </p:animEffect>
+                                  </p:childTnLst>
+                                </p:cTn>
+                              </p:par>
+                              <p:par>
+                                <p:cTn id="29" presetID="10" presetClass="entr" presetSubtype="0" fill="hold" grpId="0" nodeType="withEffect">
+                                  <p:stCondLst>
+                                    <p:cond delay="0"/>
+                                  </p:stCondLst>
+                                  <p:childTnLst>
+                                    <p:set>
+                                      <p:cBhvr>
+                                        <p:cTn id="30" dur="1" fill="hold">
+                                          <p:stCondLst>
+                                            <p:cond delay="0"/>
+                                          </p:stCondLst>
+                                        </p:cTn>
+                                        <p:tgtEl>
+                                          <p:spTgt spid="7">
+                                            <p:txEl>
+                                              <p:pRg st="2" end="2"/>
+                                            </p:txEl>
+                                          </p:spTgt>
+                                        </p:tgtEl>
+                                        <p:attrNameLst>
+                                          <p:attrName>style.visibility</p:attrName>
+                                        </p:attrNameLst>
+                                      </p:cBhvr>
+                                      <p:to>
+                                        <p:strVal val="visible"/>
+                                      </p:to>
+                                    </p:set>
+                                    <p:animEffect transition="in" filter="fade">
+                                      <p:cBhvr>
+                                        <p:cTn id="31" dur="500"/>
+                                        <p:tgtEl>
+                                          <p:spTgt spid="7">
+                                            <p:txEl>
+                                              <p:pRg st="2" end="2"/>
+                                            </p:txEl>
+                                          </p:spTgt>
+                                        </p:tgtEl>
+                                      </p:cBhvr>
+                                    </p:animEffect>
+                                  </p:childTnLst>
+                                </p:cTn>
+                              </p:par>
+                              <p:par>
+                                <p:cTn id="32" presetID="10" presetClass="entr" presetSubtype="0" fill="hold" grpId="0" nodeType="withEffect">
+                                  <p:stCondLst>
+                                    <p:cond delay="0"/>
+                                  </p:stCondLst>
+                                  <p:childTnLst>
+                                    <p:set>
+                                      <p:cBhvr>
+                                        <p:cTn id="33" dur="1" fill="hold">
+                                          <p:stCondLst>
+                                            <p:cond delay="0"/>
+                                          </p:stCondLst>
+                                        </p:cTn>
+                                        <p:tgtEl>
+                                          <p:spTgt spid="7">
+                                            <p:txEl>
+                                              <p:pRg st="3" end="3"/>
+                                            </p:txEl>
+                                          </p:spTgt>
+                                        </p:tgtEl>
+                                        <p:attrNameLst>
+                                          <p:attrName>style.visibility</p:attrName>
+                                        </p:attrNameLst>
+                                      </p:cBhvr>
+                                      <p:to>
+                                        <p:strVal val="visible"/>
+                                      </p:to>
+                                    </p:set>
+                                    <p:animEffect transition="in" filter="fade">
+                                      <p:cBhvr>
+                                        <p:cTn id="34" dur="500"/>
+                                        <p:tgtEl>
+                                          <p:spTgt spid="7">
+                                            <p:txEl>
+                                              <p:pRg st="3" end="3"/>
+                                            </p:txEl>
+                                          </p:spTgt>
+                                        </p:tgtEl>
+                                      </p:cBhvr>
+                                    </p:animEffect>
+                                  </p:childTnLst>
+                                </p:cTn>
+                              </p:par>
+                            </p:childTnLst>
+                          </p:cTn>
+                        </p:par>
+                      </p:childTnLst>
+                    </p:cTn>
+                  </p:par>
+                  <p:par>
+                    <p:cTn id="35" fill="hold">
+                      <p:stCondLst>
+                        <p:cond delay="indefinite"/>
+                      </p:stCondLst>
+                      <p:childTnLst>
+                        <p:par>
+                          <p:cTn id="36" fill="hold">
+                            <p:stCondLst>
+                              <p:cond delay="0"/>
+                            </p:stCondLst>
+                            <p:childTnLst>
+                              <p:par>
+                                <p:cTn id="37" presetID="10" presetClass="entr" presetSubtype="0" fill="hold" grpId="0" nodeType="clickEffect">
+                                  <p:stCondLst>
+                                    <p:cond delay="0"/>
+                                  </p:stCondLst>
+                                  <p:childTnLst>
+                                    <p:set>
+                                      <p:cBhvr>
+                                        <p:cTn id="38" dur="1" fill="hold">
+                                          <p:stCondLst>
+                                            <p:cond delay="0"/>
+                                          </p:stCondLst>
+                                        </p:cTn>
+                                        <p:tgtEl>
+                                          <p:spTgt spid="7">
+                                            <p:txEl>
+                                              <p:pRg st="4" end="4"/>
+                                            </p:txEl>
+                                          </p:spTgt>
+                                        </p:tgtEl>
+                                        <p:attrNameLst>
+                                          <p:attrName>style.visibility</p:attrName>
+                                        </p:attrNameLst>
+                                      </p:cBhvr>
+                                      <p:to>
+                                        <p:strVal val="visible"/>
+                                      </p:to>
+                                    </p:set>
+                                    <p:animEffect transition="in" filter="fade">
+                                      <p:cBhvr>
+                                        <p:cTn id="39" dur="500"/>
+                                        <p:tgtEl>
+                                          <p:spTgt spid="7">
+                                            <p:txEl>
+                                              <p:pRg st="4" end="4"/>
+                                            </p:txEl>
+                                          </p:spTgt>
+                                        </p:tgtEl>
+                                      </p:cBhvr>
+                                    </p:animEffect>
+                                  </p:childTnLst>
+                                </p:cTn>
+                              </p:par>
+                            </p:childTnLst>
+                          </p:cTn>
+                        </p:par>
+                      </p:childTnLst>
+                    </p:cTn>
+                  </p:par>
+                  <p:par>
+                    <p:cTn id="40" fill="hold">
+                      <p:stCondLst>
+                        <p:cond delay="indefinite"/>
+                      </p:stCondLst>
+                      <p:childTnLst>
+                        <p:par>
+                          <p:cTn id="41" fill="hold">
+                            <p:stCondLst>
+                              <p:cond delay="0"/>
+                            </p:stCondLst>
+                            <p:childTnLst>
+                              <p:par>
+                                <p:cTn id="42" presetID="10" presetClass="entr" presetSubtype="0" fill="hold" grpId="0" nodeType="clickEffect">
+                                  <p:stCondLst>
+                                    <p:cond delay="0"/>
+                                  </p:stCondLst>
+                                  <p:childTnLst>
+                                    <p:set>
+                                      <p:cBhvr>
+                                        <p:cTn id="43" dur="1" fill="hold">
+                                          <p:stCondLst>
+                                            <p:cond delay="0"/>
+                                          </p:stCondLst>
+                                        </p:cTn>
+                                        <p:tgtEl>
+                                          <p:spTgt spid="7">
+                                            <p:txEl>
+                                              <p:pRg st="5" end="5"/>
+                                            </p:txEl>
+                                          </p:spTgt>
+                                        </p:tgtEl>
+                                        <p:attrNameLst>
+                                          <p:attrName>style.visibility</p:attrName>
+                                        </p:attrNameLst>
+                                      </p:cBhvr>
+                                      <p:to>
+                                        <p:strVal val="visible"/>
+                                      </p:to>
+                                    </p:set>
+                                    <p:animEffect transition="in" filter="fade">
+                                      <p:cBhvr>
+                                        <p:cTn id="44" dur="500"/>
+                                        <p:tgtEl>
+                                          <p:spTgt spid="7">
+                                            <p:txEl>
+                                              <p:pRg st="5" end="5"/>
+                                            </p:txEl>
+                                          </p:spTgt>
+                                        </p:tgtEl>
+                                      </p:cBhvr>
+                                    </p:animEffect>
+                                  </p:childTnLst>
+                                </p:cTn>
+                              </p:par>
+                            </p:childTnLst>
+                          </p:cTn>
+                        </p:par>
+                      </p:childTnLst>
+                    </p:cTn>
+                  </p:par>
+                </p:childTnLst>
+              </p:cTn>
+              <p:prevCondLst>
+                <p:cond evt="onPrev" delay="0">
+                  <p:tgtEl>
+                    <p:sldTgt/>
+                  </p:tgtEl>
+                </p:cond>
+              </p:prevCondLst>
+              <p:nextCondLst>
+                <p:cond evt="onNext" delay="0">
+                  <p:tgtEl>
+                    <p:sldTgt/>
+                  </p:tgtEl>
+                </p:cond>
+              </p:nextCondLst>
+            </p:seq>
+          </p:childTnLst>
+        </p:cTn>
       </p:par>
     </p:tnLst>
+    <p:bldLst>
+      <p:bldP spid="7" grpId="0" uiExpand="1" build="p"/>
+    </p:bldLst>
   </p:timing>
 </p:sld>
 </file>
 
 <file path=ppt/slides/slide6.xml><?xml version="1.0" encoding="utf-8"?>
+<p:sld xmlns:a="http://schemas.openxmlformats.org/drawingml/2006/main" xmlns:r="http://schemas.openxmlformats.org/officeDocument/2006/relationships" xmlns:p="http://schemas.openxmlformats.org/presentationml/2006/main">
+  <p:cSld>
+    <p:spTree>
+      <p:nvGrpSpPr>
+        <p:cNvPr id="1" name=""/>
+        <p:cNvGrpSpPr/>
+        <p:nvPr/>
+      </p:nvGrpSpPr>
+      <p:grpSpPr>
+        <a:xfrm>
+          <a:off x="0" y="0"/>
+          <a:ext cx="0" cy="0"/>
+          <a:chOff x="0" y="0"/>
+          <a:chExt cx="0" cy="0"/>
+        </a:xfrm>
+      </p:grpSpPr>
+      <p:sp>
+        <p:nvSpPr>
+          <p:cNvPr id="2" name="Title 1"/>
+          <p:cNvSpPr>
+            <a:spLocks noGrp="1"/>
+          </p:cNvSpPr>
+          <p:nvPr>
+            <p:ph type="title"/>
+          </p:nvPr>
+        </p:nvSpPr>
+        <p:spPr/>
+        <p:txBody>
+          <a:bodyPr/>
+          <a:lstStyle/>
+          <a:p>
+            <a:r>
+              <a:rPr lang="en-US" dirty="0" smtClean="0">
+                <a:latin typeface="High Tower Text" panose="02040502050506030303" pitchFamily="18" charset="0"/>
+              </a:rPr>
+              <a:t>Scenario: CubeSat</a:t>
+            </a:r>
+            <a:endParaRPr lang="en-US" dirty="0">
+              <a:latin typeface="High Tower Text" panose="02040502050506030303" pitchFamily="18" charset="0"/>
+            </a:endParaRPr>
+          </a:p>
+        </p:txBody>
+      </p:sp>
+      <p:sp>
+        <p:nvSpPr>
+          <p:cNvPr id="7" name="Content Placeholder 2"/>
+          <p:cNvSpPr txBox="1">
+            <a:spLocks/>
+          </p:cNvSpPr>
+          <p:nvPr/>
+        </p:nvSpPr>
+        <p:spPr>
+          <a:xfrm>
+            <a:off x="838200" y="1701009"/>
+            <a:ext cx="10515600" cy="4351338"/>
+          </a:xfrm>
+          <a:prstGeom prst="rect">
+            <a:avLst/>
+          </a:prstGeom>
+        </p:spPr>
+        <p:txBody>
+          <a:bodyPr vert="horz" lIns="91440" tIns="45720" rIns="91440" bIns="45720" rtlCol="0">
+            <a:normAutofit/>
+          </a:bodyPr>
+          <a:lstStyle>
+            <a:lvl1pPr marL="228600" indent="-228600" algn="l" defTabSz="914400" rtl="0" eaLnBrk="1" latinLnBrk="0" hangingPunct="1">
+              <a:lnSpc>
+                <a:spcPct val="90000"/>
+              </a:lnSpc>
+              <a:spcBef>
+                <a:spcPts val="1000"/>
+              </a:spcBef>
+              <a:buFont typeface="Arial" panose="020B0604020202020204" pitchFamily="34" charset="0"/>
+              <a:buChar char="•"/>
+              <a:defRPr sz="2800" kern="1200">
+                <a:solidFill>
+                  <a:schemeClr val="tx1"/>
+                </a:solidFill>
+                <a:latin typeface="+mn-lt"/>
+                <a:ea typeface="+mn-ea"/>
+                <a:cs typeface="+mn-cs"/>
+              </a:defRPr>
+            </a:lvl1pPr>
+            <a:lvl2pPr marL="685800" indent="-228600" algn="l" defTabSz="914400" rtl="0" eaLnBrk="1" latinLnBrk="0" hangingPunct="1">
+              <a:lnSpc>
+                <a:spcPct val="90000"/>
+              </a:lnSpc>
+              <a:spcBef>
+                <a:spcPts val="500"/>
+              </a:spcBef>
+              <a:buFont typeface="Arial" panose="020B0604020202020204" pitchFamily="34" charset="0"/>
+              <a:buChar char="•"/>
+              <a:defRPr sz="2400" kern="1200">
+                <a:solidFill>
+                  <a:schemeClr val="tx1"/>
+                </a:solidFill>
+                <a:latin typeface="+mn-lt"/>
+                <a:ea typeface="+mn-ea"/>
+                <a:cs typeface="+mn-cs"/>
+              </a:defRPr>
+            </a:lvl2pPr>
+            <a:lvl3pPr marL="1143000" indent="-228600" algn="l" defTabSz="914400" rtl="0" eaLnBrk="1" latinLnBrk="0" hangingPunct="1">
+              <a:lnSpc>
+                <a:spcPct val="90000"/>
+              </a:lnSpc>
+              <a:spcBef>
+                <a:spcPts val="500"/>
+              </a:spcBef>
+              <a:buFont typeface="Arial" panose="020B0604020202020204" pitchFamily="34" charset="0"/>
+              <a:buChar char="•"/>
+              <a:defRPr sz="2000" kern="1200">
+                <a:solidFill>
+                  <a:schemeClr val="tx1"/>
+                </a:solidFill>
+                <a:latin typeface="+mn-lt"/>
+                <a:ea typeface="+mn-ea"/>
+                <a:cs typeface="+mn-cs"/>
+              </a:defRPr>
+            </a:lvl3pPr>
+            <a:lvl4pPr marL="1600200" indent="-228600" algn="l" defTabSz="914400" rtl="0" eaLnBrk="1" latinLnBrk="0" hangingPunct="1">
+              <a:lnSpc>
+                <a:spcPct val="90000"/>
+              </a:lnSpc>
+              <a:spcBef>
+                <a:spcPts val="500"/>
+              </a:spcBef>
+              <a:buFont typeface="Arial" panose="020B0604020202020204" pitchFamily="34" charset="0"/>
+              <a:buChar char="•"/>
+              <a:defRPr sz="1800" kern="1200">
+                <a:solidFill>
+                  <a:schemeClr val="tx1"/>
+                </a:solidFill>
+                <a:latin typeface="+mn-lt"/>
+                <a:ea typeface="+mn-ea"/>
+                <a:cs typeface="+mn-cs"/>
+              </a:defRPr>
+            </a:lvl4pPr>
+            <a:lvl5pPr marL="2057400" indent="-228600" algn="l" defTabSz="914400" rtl="0" eaLnBrk="1" latinLnBrk="0" hangingPunct="1">
+              <a:lnSpc>
+                <a:spcPct val="90000"/>
+              </a:lnSpc>
+              <a:spcBef>
+                <a:spcPts val="500"/>
+              </a:spcBef>
+              <a:buFont typeface="Arial" panose="020B0604020202020204" pitchFamily="34" charset="0"/>
+              <a:buChar char="•"/>
+              <a:defRPr sz="1800" kern="1200">
+                <a:solidFill>
+                  <a:schemeClr val="tx1"/>
+                </a:solidFill>
+                <a:latin typeface="+mn-lt"/>
+                <a:ea typeface="+mn-ea"/>
+                <a:cs typeface="+mn-cs"/>
+              </a:defRPr>
+            </a:lvl5pPr>
+            <a:lvl6pPr marL="2514600" indent="-228600" algn="l" defTabSz="914400" rtl="0" eaLnBrk="1" latinLnBrk="0" hangingPunct="1">
+              <a:lnSpc>
+                <a:spcPct val="90000"/>
+              </a:lnSpc>
+              <a:spcBef>
+                <a:spcPts val="500"/>
+              </a:spcBef>
+              <a:buFont typeface="Arial" panose="020B0604020202020204" pitchFamily="34" charset="0"/>
+              <a:buChar char="•"/>
+              <a:defRPr sz="1800" kern="1200">
+                <a:solidFill>
+                  <a:schemeClr val="tx1"/>
+                </a:solidFill>
+                <a:latin typeface="+mn-lt"/>
+                <a:ea typeface="+mn-ea"/>
+                <a:cs typeface="+mn-cs"/>
+              </a:defRPr>
+            </a:lvl6pPr>
+            <a:lvl7pPr marL="2971800" indent="-228600" algn="l" defTabSz="914400" rtl="0" eaLnBrk="1" latinLnBrk="0" hangingPunct="1">
+              <a:lnSpc>
+                <a:spcPct val="90000"/>
+              </a:lnSpc>
+              <a:spcBef>
+                <a:spcPts val="500"/>
+              </a:spcBef>
+              <a:buFont typeface="Arial" panose="020B0604020202020204" pitchFamily="34" charset="0"/>
+              <a:buChar char="•"/>
+              <a:defRPr sz="1800" kern="1200">
+                <a:solidFill>
+                  <a:schemeClr val="tx1"/>
+                </a:solidFill>
+                <a:latin typeface="+mn-lt"/>
+                <a:ea typeface="+mn-ea"/>
+                <a:cs typeface="+mn-cs"/>
+              </a:defRPr>
+            </a:lvl7pPr>
+            <a:lvl8pPr marL="3429000" indent="-228600" algn="l" defTabSz="914400" rtl="0" eaLnBrk="1" latinLnBrk="0" hangingPunct="1">
+              <a:lnSpc>
+                <a:spcPct val="90000"/>
+              </a:lnSpc>
+              <a:spcBef>
+                <a:spcPts val="500"/>
+              </a:spcBef>
+              <a:buFont typeface="Arial" panose="020B0604020202020204" pitchFamily="34" charset="0"/>
+              <a:buChar char="•"/>
+              <a:defRPr sz="1800" kern="1200">
+                <a:solidFill>
+                  <a:schemeClr val="tx1"/>
+                </a:solidFill>
+                <a:latin typeface="+mn-lt"/>
+                <a:ea typeface="+mn-ea"/>
+                <a:cs typeface="+mn-cs"/>
+              </a:defRPr>
+            </a:lvl8pPr>
+            <a:lvl9pPr marL="3886200" indent="-228600" algn="l" defTabSz="914400" rtl="0" eaLnBrk="1" latinLnBrk="0" hangingPunct="1">
+              <a:lnSpc>
+                <a:spcPct val="90000"/>
+              </a:lnSpc>
+              <a:spcBef>
+                <a:spcPts val="500"/>
+              </a:spcBef>
+              <a:buFont typeface="Arial" panose="020B0604020202020204" pitchFamily="34" charset="0"/>
+              <a:buChar char="•"/>
+              <a:defRPr sz="1800" kern="1200">
+                <a:solidFill>
+                  <a:schemeClr val="tx1"/>
+                </a:solidFill>
+                <a:latin typeface="+mn-lt"/>
+                <a:ea typeface="+mn-ea"/>
+                <a:cs typeface="+mn-cs"/>
+              </a:defRPr>
+            </a:lvl9pPr>
+          </a:lstStyle>
+          <a:p>
+            <a:r>
+              <a:rPr lang="en-US" dirty="0" smtClean="0">
+                <a:latin typeface="High Tower Text" panose="02040502050506030303" pitchFamily="18" charset="0"/>
+              </a:rPr>
+              <a:t>Science</a:t>
+            </a:r>
+            <a:r>
+              <a:rPr lang="en-US" dirty="0" smtClean="0">
+                <a:latin typeface="High Tower Text" panose="02040502050506030303" pitchFamily="18" charset="0"/>
+              </a:rPr>
+              <a:t>!</a:t>
+            </a:r>
+            <a:endParaRPr lang="en-US" dirty="0">
+              <a:latin typeface="High Tower Text" panose="02040502050506030303" pitchFamily="18" charset="0"/>
+            </a:endParaRPr>
+          </a:p>
+          <a:p>
+            <a:r>
+              <a:rPr lang="en-US" dirty="0" smtClean="0">
+                <a:latin typeface="High Tower Text" panose="02040502050506030303" pitchFamily="18" charset="0"/>
+              </a:rPr>
+              <a:t>If necessary send science data to the </a:t>
+            </a:r>
+            <a:r>
+              <a:rPr lang="en-US" dirty="0" smtClean="0">
+                <a:solidFill>
+                  <a:srgbClr val="00B0F0"/>
+                </a:solidFill>
+                <a:latin typeface="High Tower Text" panose="02040502050506030303" pitchFamily="18" charset="0"/>
+              </a:rPr>
+              <a:t>CubeSat elected to downlink</a:t>
+            </a:r>
+          </a:p>
+          <a:p>
+            <a:r>
+              <a:rPr lang="en-US" dirty="0" smtClean="0">
+                <a:latin typeface="High Tower Text" panose="02040502050506030303" pitchFamily="18" charset="0"/>
+              </a:rPr>
+              <a:t>Participate in the election of downlink CubeSat</a:t>
+            </a:r>
+          </a:p>
+          <a:p>
+            <a:r>
+              <a:rPr lang="en-US" dirty="0" smtClean="0">
+                <a:latin typeface="High Tower Text" panose="02040502050506030303" pitchFamily="18" charset="0"/>
+              </a:rPr>
+              <a:t>Potentially receive commands and/or network state routed from ground</a:t>
+            </a:r>
+          </a:p>
+          <a:p>
+            <a:pPr lvl="1"/>
+            <a:r>
+              <a:rPr lang="en-US" dirty="0" smtClean="0">
+                <a:latin typeface="High Tower Text" panose="02040502050506030303" pitchFamily="18" charset="0"/>
+              </a:rPr>
+              <a:t>Research focus placed on movement of science data</a:t>
+            </a:r>
+          </a:p>
+          <a:p>
+            <a:endParaRPr lang="en-US" dirty="0">
+              <a:latin typeface="High Tower Text" panose="02040502050506030303" pitchFamily="18" charset="0"/>
+            </a:endParaRPr>
+          </a:p>
+          <a:p>
+            <a:r>
+              <a:rPr lang="en-US" dirty="0" smtClean="0">
+                <a:latin typeface="High Tower Text" panose="02040502050506030303" pitchFamily="18" charset="0"/>
+              </a:rPr>
+              <a:t>Can get GPS time and location and will be preloaded                         with ground fly-over windows. </a:t>
+            </a:r>
+          </a:p>
+        </p:txBody>
+      </p:sp>
+      <p:pic>
+        <p:nvPicPr>
+          <p:cNvPr id="9" name="Picture 8"/>
+          <p:cNvPicPr>
+            <a:picLocks noChangeAspect="1"/>
+          </p:cNvPicPr>
+          <p:nvPr/>
+        </p:nvPicPr>
+        <p:blipFill>
+          <a:blip r:embed="rId2" cstate="print">
+            <a:extLst>
+              <a:ext uri="{28A0092B-C50C-407E-A947-70E740481C1C}">
+                <a14:useLocalDpi xmlns:a14="http://schemas.microsoft.com/office/drawing/2010/main" val="0"/>
+              </a:ext>
+            </a:extLst>
+          </a:blip>
+          <a:stretch>
+            <a:fillRect/>
+          </a:stretch>
+        </p:blipFill>
+        <p:spPr>
+          <a:xfrm>
+            <a:off x="8527642" y="295991"/>
+            <a:ext cx="3286988" cy="1168273"/>
+          </a:xfrm>
+          <a:prstGeom prst="rect">
+            <a:avLst/>
+          </a:prstGeom>
+        </p:spPr>
+      </p:pic>
+    </p:spTree>
+    <p:extLst>
+      <p:ext uri="{BB962C8B-B14F-4D97-AF65-F5344CB8AC3E}">
+        <p14:creationId xmlns:p14="http://schemas.microsoft.com/office/powerpoint/2010/main" val="1233346978"/>
+      </p:ext>
+    </p:extLst>
+  </p:cSld>
+  <p:clrMapOvr>
+    <a:masterClrMapping/>
+  </p:clrMapOvr>
+  <p:timing>
+    <p:tnLst>
+      <p:par>
+        <p:cTn id="1" dur="indefinite" restart="never" nodeType="tmRoot">
+          <p:childTnLst>
+            <p:seq concurrent="1" nextAc="seek">
+              <p:cTn id="2" dur="indefinite" nodeType="mainSeq">
+                <p:childTnLst>
+                  <p:par>
+                    <p:cTn id="3" fill="hold">
+                      <p:stCondLst>
+                        <p:cond delay="indefinite"/>
+                      </p:stCondLst>
+                      <p:childTnLst>
+                        <p:par>
+                          <p:cTn id="4" fill="hold">
+                            <p:stCondLst>
+                              <p:cond delay="0"/>
+                            </p:stCondLst>
+                            <p:childTnLst>
+                              <p:par>
+                                <p:cTn id="5" presetID="10" presetClass="entr" presetSubtype="0" fill="hold" grpId="0" nodeType="clickEffect">
+                                  <p:stCondLst>
+                                    <p:cond delay="0"/>
+                                  </p:stCondLst>
+                                  <p:childTnLst>
+                                    <p:set>
+                                      <p:cBhvr>
+                                        <p:cTn id="6" dur="1" fill="hold">
+                                          <p:stCondLst>
+                                            <p:cond delay="0"/>
+                                          </p:stCondLst>
+                                        </p:cTn>
+                                        <p:tgtEl>
+                                          <p:spTgt spid="7">
+                                            <p:txEl>
+                                              <p:pRg st="0" end="0"/>
+                                            </p:txEl>
+                                          </p:spTgt>
+                                        </p:tgtEl>
+                                        <p:attrNameLst>
+                                          <p:attrName>style.visibility</p:attrName>
+                                        </p:attrNameLst>
+                                      </p:cBhvr>
+                                      <p:to>
+                                        <p:strVal val="visible"/>
+                                      </p:to>
+                                    </p:set>
+                                    <p:animEffect transition="in" filter="fade">
+                                      <p:cBhvr>
+                                        <p:cTn id="7" dur="500"/>
+                                        <p:tgtEl>
+                                          <p:spTgt spid="7">
+                                            <p:txEl>
+                                              <p:pRg st="0" end="0"/>
+                                            </p:txEl>
+                                          </p:spTgt>
+                                        </p:tgtEl>
+                                      </p:cBhvr>
+                                    </p:animEffect>
+                                  </p:childTnLst>
+                                </p:cTn>
+                              </p:par>
+                              <p:par>
+                                <p:cTn id="8" presetID="31" presetClass="entr" presetSubtype="0" fill="hold" nodeType="withEffect">
+                                  <p:stCondLst>
+                                    <p:cond delay="0"/>
+                                  </p:stCondLst>
+                                  <p:childTnLst>
+                                    <p:set>
+                                      <p:cBhvr>
+                                        <p:cTn id="9" dur="1" fill="hold">
+                                          <p:stCondLst>
+                                            <p:cond delay="0"/>
+                                          </p:stCondLst>
+                                        </p:cTn>
+                                        <p:tgtEl>
+                                          <p:spTgt spid="9"/>
+                                        </p:tgtEl>
+                                        <p:attrNameLst>
+                                          <p:attrName>style.visibility</p:attrName>
+                                        </p:attrNameLst>
+                                      </p:cBhvr>
+                                      <p:to>
+                                        <p:strVal val="visible"/>
+                                      </p:to>
+                                    </p:set>
+                                    <p:anim calcmode="lin" valueType="num">
+                                      <p:cBhvr>
+                                        <p:cTn id="10" dur="1000" fill="hold"/>
+                                        <p:tgtEl>
+                                          <p:spTgt spid="9"/>
+                                        </p:tgtEl>
+                                        <p:attrNameLst>
+                                          <p:attrName>ppt_w</p:attrName>
+                                        </p:attrNameLst>
+                                      </p:cBhvr>
+                                      <p:tavLst>
+                                        <p:tav tm="0">
+                                          <p:val>
+                                            <p:fltVal val="0"/>
+                                          </p:val>
+                                        </p:tav>
+                                        <p:tav tm="100000">
+                                          <p:val>
+                                            <p:strVal val="#ppt_w"/>
+                                          </p:val>
+                                        </p:tav>
+                                      </p:tavLst>
+                                    </p:anim>
+                                    <p:anim calcmode="lin" valueType="num">
+                                      <p:cBhvr>
+                                        <p:cTn id="11" dur="1000" fill="hold"/>
+                                        <p:tgtEl>
+                                          <p:spTgt spid="9"/>
+                                        </p:tgtEl>
+                                        <p:attrNameLst>
+                                          <p:attrName>ppt_h</p:attrName>
+                                        </p:attrNameLst>
+                                      </p:cBhvr>
+                                      <p:tavLst>
+                                        <p:tav tm="0">
+                                          <p:val>
+                                            <p:fltVal val="0"/>
+                                          </p:val>
+                                        </p:tav>
+                                        <p:tav tm="100000">
+                                          <p:val>
+                                            <p:strVal val="#ppt_h"/>
+                                          </p:val>
+                                        </p:tav>
+                                      </p:tavLst>
+                                    </p:anim>
+                                    <p:anim calcmode="lin" valueType="num">
+                                      <p:cBhvr>
+                                        <p:cTn id="12" dur="1000" fill="hold"/>
+                                        <p:tgtEl>
+                                          <p:spTgt spid="9"/>
+                                        </p:tgtEl>
+                                        <p:attrNameLst>
+                                          <p:attrName>style.rotation</p:attrName>
+                                        </p:attrNameLst>
+                                      </p:cBhvr>
+                                      <p:tavLst>
+                                        <p:tav tm="0">
+                                          <p:val>
+                                            <p:fltVal val="90"/>
+                                          </p:val>
+                                        </p:tav>
+                                        <p:tav tm="100000">
+                                          <p:val>
+                                            <p:fltVal val="0"/>
+                                          </p:val>
+                                        </p:tav>
+                                      </p:tavLst>
+                                    </p:anim>
+                                    <p:animEffect transition="in" filter="fade">
+                                      <p:cBhvr>
+                                        <p:cTn id="13" dur="1000"/>
+                                        <p:tgtEl>
+                                          <p:spTgt spid="9"/>
+                                        </p:tgtEl>
+                                      </p:cBhvr>
+                                    </p:animEffect>
+                                  </p:childTnLst>
+                                </p:cTn>
+                              </p:par>
+                            </p:childTnLst>
+                          </p:cTn>
+                        </p:par>
+                      </p:childTnLst>
+                    </p:cTn>
+                  </p:par>
+                  <p:par>
+                    <p:cTn id="14" fill="hold">
+                      <p:stCondLst>
+                        <p:cond delay="indefinite"/>
+                      </p:stCondLst>
+                      <p:childTnLst>
+                        <p:par>
+                          <p:cTn id="15" fill="hold">
+                            <p:stCondLst>
+                              <p:cond delay="0"/>
+                            </p:stCondLst>
+                            <p:childTnLst>
+                              <p:par>
+                                <p:cTn id="16" presetID="10" presetClass="entr" presetSubtype="0" fill="hold" grpId="0" nodeType="clickEffect">
+                                  <p:stCondLst>
+                                    <p:cond delay="0"/>
+                                  </p:stCondLst>
+                                  <p:childTnLst>
+                                    <p:set>
+                                      <p:cBhvr>
+                                        <p:cTn id="17" dur="1" fill="hold">
+                                          <p:stCondLst>
+                                            <p:cond delay="0"/>
+                                          </p:stCondLst>
+                                        </p:cTn>
+                                        <p:tgtEl>
+                                          <p:spTgt spid="7">
+                                            <p:txEl>
+                                              <p:pRg st="1" end="1"/>
+                                            </p:txEl>
+                                          </p:spTgt>
+                                        </p:tgtEl>
+                                        <p:attrNameLst>
+                                          <p:attrName>style.visibility</p:attrName>
+                                        </p:attrNameLst>
+                                      </p:cBhvr>
+                                      <p:to>
+                                        <p:strVal val="visible"/>
+                                      </p:to>
+                                    </p:set>
+                                    <p:animEffect transition="in" filter="fade">
+                                      <p:cBhvr>
+                                        <p:cTn id="18" dur="500"/>
+                                        <p:tgtEl>
+                                          <p:spTgt spid="7">
+                                            <p:txEl>
+                                              <p:pRg st="1" end="1"/>
+                                            </p:txEl>
+                                          </p:spTgt>
+                                        </p:tgtEl>
+                                      </p:cBhvr>
+                                    </p:animEffect>
+                                  </p:childTnLst>
+                                </p:cTn>
+                              </p:par>
+                            </p:childTnLst>
+                          </p:cTn>
+                        </p:par>
+                      </p:childTnLst>
+                    </p:cTn>
+                  </p:par>
+                  <p:par>
+                    <p:cTn id="19" fill="hold">
+                      <p:stCondLst>
+                        <p:cond delay="indefinite"/>
+                      </p:stCondLst>
+                      <p:childTnLst>
+                        <p:par>
+                          <p:cTn id="20" fill="hold">
+                            <p:stCondLst>
+                              <p:cond delay="0"/>
+                            </p:stCondLst>
+                            <p:childTnLst>
+                              <p:par>
+                                <p:cTn id="21" presetID="10" presetClass="entr" presetSubtype="0" fill="hold" grpId="0" nodeType="clickEffect">
+                                  <p:stCondLst>
+                                    <p:cond delay="0"/>
+                                  </p:stCondLst>
+                                  <p:childTnLst>
+                                    <p:set>
+                                      <p:cBhvr>
+                                        <p:cTn id="22" dur="1" fill="hold">
+                                          <p:stCondLst>
+                                            <p:cond delay="0"/>
+                                          </p:stCondLst>
+                                        </p:cTn>
+                                        <p:tgtEl>
+                                          <p:spTgt spid="7">
+                                            <p:txEl>
+                                              <p:pRg st="2" end="2"/>
+                                            </p:txEl>
+                                          </p:spTgt>
+                                        </p:tgtEl>
+                                        <p:attrNameLst>
+                                          <p:attrName>style.visibility</p:attrName>
+                                        </p:attrNameLst>
+                                      </p:cBhvr>
+                                      <p:to>
+                                        <p:strVal val="visible"/>
+                                      </p:to>
+                                    </p:set>
+                                    <p:animEffect transition="in" filter="fade">
+                                      <p:cBhvr>
+                                        <p:cTn id="23" dur="500"/>
+                                        <p:tgtEl>
+                                          <p:spTgt spid="7">
+                                            <p:txEl>
+                                              <p:pRg st="2" end="2"/>
+                                            </p:txEl>
+                                          </p:spTgt>
+                                        </p:tgtEl>
+                                      </p:cBhvr>
+                                    </p:animEffect>
+                                  </p:childTnLst>
+                                </p:cTn>
+                              </p:par>
+                            </p:childTnLst>
+                          </p:cTn>
+                        </p:par>
+                      </p:childTnLst>
+                    </p:cTn>
+                  </p:par>
+                  <p:par>
+                    <p:cTn id="24" fill="hold">
+                      <p:stCondLst>
+                        <p:cond delay="indefinite"/>
+                      </p:stCondLst>
+                      <p:childTnLst>
+                        <p:par>
+                          <p:cTn id="25" fill="hold">
+                            <p:stCondLst>
+                              <p:cond delay="0"/>
+                            </p:stCondLst>
+                            <p:childTnLst>
+                              <p:par>
+                                <p:cTn id="26" presetID="10" presetClass="entr" presetSubtype="0" fill="hold" grpId="0" nodeType="clickEffect">
+                                  <p:stCondLst>
+                                    <p:cond delay="0"/>
+                                  </p:stCondLst>
+                                  <p:childTnLst>
+                                    <p:set>
+                                      <p:cBhvr>
+                                        <p:cTn id="27" dur="1" fill="hold">
+                                          <p:stCondLst>
+                                            <p:cond delay="0"/>
+                                          </p:stCondLst>
+                                        </p:cTn>
+                                        <p:tgtEl>
+                                          <p:spTgt spid="7">
+                                            <p:txEl>
+                                              <p:pRg st="3" end="3"/>
+                                            </p:txEl>
+                                          </p:spTgt>
+                                        </p:tgtEl>
+                                        <p:attrNameLst>
+                                          <p:attrName>style.visibility</p:attrName>
+                                        </p:attrNameLst>
+                                      </p:cBhvr>
+                                      <p:to>
+                                        <p:strVal val="visible"/>
+                                      </p:to>
+                                    </p:set>
+                                    <p:animEffect transition="in" filter="fade">
+                                      <p:cBhvr>
+                                        <p:cTn id="28" dur="500"/>
+                                        <p:tgtEl>
+                                          <p:spTgt spid="7">
+                                            <p:txEl>
+                                              <p:pRg st="3" end="3"/>
+                                            </p:txEl>
+                                          </p:spTgt>
+                                        </p:tgtEl>
+                                      </p:cBhvr>
+                                    </p:animEffect>
+                                  </p:childTnLst>
+                                </p:cTn>
+                              </p:par>
+                              <p:par>
+                                <p:cTn id="29" presetID="10" presetClass="entr" presetSubtype="0" fill="hold" grpId="0" nodeType="withEffect">
+                                  <p:stCondLst>
+                                    <p:cond delay="0"/>
+                                  </p:stCondLst>
+                                  <p:childTnLst>
+                                    <p:set>
+                                      <p:cBhvr>
+                                        <p:cTn id="30" dur="1" fill="hold">
+                                          <p:stCondLst>
+                                            <p:cond delay="0"/>
+                                          </p:stCondLst>
+                                        </p:cTn>
+                                        <p:tgtEl>
+                                          <p:spTgt spid="7">
+                                            <p:txEl>
+                                              <p:pRg st="4" end="4"/>
+                                            </p:txEl>
+                                          </p:spTgt>
+                                        </p:tgtEl>
+                                        <p:attrNameLst>
+                                          <p:attrName>style.visibility</p:attrName>
+                                        </p:attrNameLst>
+                                      </p:cBhvr>
+                                      <p:to>
+                                        <p:strVal val="visible"/>
+                                      </p:to>
+                                    </p:set>
+                                    <p:animEffect transition="in" filter="fade">
+                                      <p:cBhvr>
+                                        <p:cTn id="31" dur="500"/>
+                                        <p:tgtEl>
+                                          <p:spTgt spid="7">
+                                            <p:txEl>
+                                              <p:pRg st="4" end="4"/>
+                                            </p:txEl>
+                                          </p:spTgt>
+                                        </p:tgtEl>
+                                      </p:cBhvr>
+                                    </p:animEffect>
+                                  </p:childTnLst>
+                                </p:cTn>
+                              </p:par>
+                            </p:childTnLst>
+                          </p:cTn>
+                        </p:par>
+                      </p:childTnLst>
+                    </p:cTn>
+                  </p:par>
+                  <p:par>
+                    <p:cTn id="32" fill="hold">
+                      <p:stCondLst>
+                        <p:cond delay="indefinite"/>
+                      </p:stCondLst>
+                      <p:childTnLst>
+                        <p:par>
+                          <p:cTn id="33" fill="hold">
+                            <p:stCondLst>
+                              <p:cond delay="0"/>
+                            </p:stCondLst>
+                            <p:childTnLst>
+                              <p:par>
+                                <p:cTn id="34" presetID="10" presetClass="entr" presetSubtype="0" fill="hold" grpId="0" nodeType="clickEffect">
+                                  <p:stCondLst>
+                                    <p:cond delay="0"/>
+                                  </p:stCondLst>
+                                  <p:childTnLst>
+                                    <p:set>
+                                      <p:cBhvr>
+                                        <p:cTn id="35" dur="1" fill="hold">
+                                          <p:stCondLst>
+                                            <p:cond delay="0"/>
+                                          </p:stCondLst>
+                                        </p:cTn>
+                                        <p:tgtEl>
+                                          <p:spTgt spid="7">
+                                            <p:txEl>
+                                              <p:pRg st="6" end="6"/>
+                                            </p:txEl>
+                                          </p:spTgt>
+                                        </p:tgtEl>
+                                        <p:attrNameLst>
+                                          <p:attrName>style.visibility</p:attrName>
+                                        </p:attrNameLst>
+                                      </p:cBhvr>
+                                      <p:to>
+                                        <p:strVal val="visible"/>
+                                      </p:to>
+                                    </p:set>
+                                    <p:animEffect transition="in" filter="fade">
+                                      <p:cBhvr>
+                                        <p:cTn id="36" dur="500"/>
+                                        <p:tgtEl>
+                                          <p:spTgt spid="7">
+                                            <p:txEl>
+                                              <p:pRg st="6" end="6"/>
+                                            </p:txEl>
+                                          </p:spTgt>
+                                        </p:tgtEl>
+                                      </p:cBhvr>
+                                    </p:animEffect>
+                                  </p:childTnLst>
+                                </p:cTn>
+                              </p:par>
+                            </p:childTnLst>
+                          </p:cTn>
+                        </p:par>
+                      </p:childTnLst>
+                    </p:cTn>
+                  </p:par>
+                </p:childTnLst>
+              </p:cTn>
+              <p:prevCondLst>
+                <p:cond evt="onPrev" delay="0">
+                  <p:tgtEl>
+                    <p:sldTgt/>
+                  </p:tgtEl>
+                </p:cond>
+              </p:prevCondLst>
+              <p:nextCondLst>
+                <p:cond evt="onNext" delay="0">
+                  <p:tgtEl>
+                    <p:sldTgt/>
+                  </p:tgtEl>
+                </p:cond>
+              </p:nextCondLst>
+            </p:seq>
+          </p:childTnLst>
+        </p:cTn>
+      </p:par>
+    </p:tnLst>
+    <p:bldLst>
+      <p:bldP spid="7" grpId="0" uiExpand="1" build="p"/>
+    </p:bldLst>
+  </p:timing>
+</p:sld>
+</file>
+
+<file path=ppt/slides/slide7.xml><?xml version="1.0" encoding="utf-8"?>
 <p:sld xmlns:a="http://schemas.openxmlformats.org/drawingml/2006/main" xmlns:r="http://schemas.openxmlformats.org/officeDocument/2006/relationships" xmlns:p="http://schemas.openxmlformats.org/presentationml/2006/main">
   <p:cSld>
     <p:spTree>
@@ -6742,7 +8761,7 @@
               <a:rPr lang="en-US" dirty="0" smtClean="0">
                 <a:latin typeface="High Tower Text" panose="02040502050506030303" pitchFamily="18" charset="0"/>
               </a:rPr>
-              <a:t>Downlink speeds often of </a:t>
+              <a:t>Downlink speeds around </a:t>
             </a:r>
             <a:r>
               <a:rPr lang="en-US" dirty="0" smtClean="0">
@@ -6751,12 +8770,34 @@
                 </a:solidFill>
                 <a:latin typeface="High Tower Text" panose="02040502050506030303" pitchFamily="18" charset="0"/>
               </a:rPr>
-              <a:t>the order of tens of kbps</a:t>
+              <a:t>9.6kbps</a:t>
             </a:r>
           </a:p>
           <a:p>
             <a:r>
               <a:rPr lang="en-US" dirty="0" smtClean="0">
+                <a:solidFill>
+                  <a:srgbClr val="00B0F0"/>
+                </a:solidFill>
+                <a:latin typeface="High Tower Text" panose="02040502050506030303" pitchFamily="18" charset="0"/>
+              </a:rPr>
+              <a:t>Downlink consumes considerable power</a:t>
+            </a:r>
+          </a:p>
+          <a:p>
+            <a:r>
+              <a:rPr lang="en-US" dirty="0" smtClean="0">
+                <a:solidFill>
+                  <a:srgbClr val="00B0F0"/>
+                </a:solidFill>
+                <a:latin typeface="High Tower Text" panose="02040502050506030303" pitchFamily="18" charset="0"/>
+              </a:rPr>
+              <a:t>CubeSats must share downlink duty</a:t>
+            </a:r>
+          </a:p>
+          <a:p>
+            <a:r>
+              <a:rPr lang="en-US" dirty="0" smtClean="0">
                 <a:latin typeface="High Tower Text" panose="02040502050506030303" pitchFamily="18" charset="0"/>
               </a:rPr>
               <a:t>Accurately modelling constellation configuration                                on a single CubeSat is too costly</a:t>
@@ -6767,31 +8808,8 @@
               <a:rPr lang="en-US" dirty="0" smtClean="0">
                 <a:latin typeface="High Tower Text" panose="02040502050506030303" pitchFamily="18" charset="0"/>
               </a:rPr>
-              <a:t>Constellation updates will have come from ground</a:t>
-            </a:r>
-          </a:p>
-          <a:p>
-            <a:r>
-              <a:rPr lang="en-US" dirty="0" smtClean="0">
-                <a:latin typeface="High Tower Text" panose="02040502050506030303" pitchFamily="18" charset="0"/>
-              </a:rPr>
-              <a:t>The constellation may be partitioned with out of date                          telemetry. </a:t>
-            </a:r>
-            <a:r>
-              <a:rPr lang="en-US" dirty="0" smtClean="0">
-                <a:solidFill>
-                  <a:srgbClr val="00B0F0"/>
-                </a:solidFill>
-                <a:latin typeface="High Tower Text" panose="02040502050506030303" pitchFamily="18" charset="0"/>
-              </a:rPr>
-              <a:t>Portions could become isolated</a:t>
-            </a:r>
-            <a:endParaRPr lang="en-US" dirty="0">
-              <a:solidFill>
-                <a:srgbClr val="00B0F0"/>
-              </a:solidFill>
-              <a:latin typeface="High Tower Text" panose="02040502050506030303" pitchFamily="18" charset="0"/>
-            </a:endParaRPr>
+              <a:t>Constellation may be partitioned</a:t>
+            </a:r>
           </a:p>
         </p:txBody>
       </p:sp>
@@ -6808,14 +8826,406 @@
   <p:timing>
     <p:tnLst>
       <p:par>
-        <p:cTn id="1" dur="indefinite" restart="never" nodeType="tmRoot"/>
+        <p:cTn id="1" dur="indefinite" restart="never" nodeType="tmRoot">
+          <p:childTnLst>
+            <p:seq concurrent="1" nextAc="seek">
+              <p:cTn id="2" dur="indefinite" nodeType="mainSeq">
+                <p:childTnLst>
+                  <p:par>
+                    <p:cTn id="3" fill="hold">
+                      <p:stCondLst>
+                        <p:cond delay="indefinite"/>
+                      </p:stCondLst>
+                      <p:childTnLst>
+                        <p:par>
+                          <p:cTn id="4" fill="hold">
+                            <p:stCondLst>
+                              <p:cond delay="0"/>
+                            </p:stCondLst>
+                            <p:childTnLst>
+                              <p:par>
+                                <p:cTn id="5" presetID="10" presetClass="entr" presetSubtype="0" fill="hold" grpId="0" nodeType="clickEffect">
+                                  <p:stCondLst>
+                                    <p:cond delay="0"/>
+                                  </p:stCondLst>
+                                  <p:childTnLst>
+                                    <p:set>
+                                      <p:cBhvr>
+                                        <p:cTn id="6" dur="1" fill="hold">
+                                          <p:stCondLst>
+                                            <p:cond delay="0"/>
+                                          </p:stCondLst>
+                                        </p:cTn>
+                                        <p:tgtEl>
+                                          <p:spTgt spid="5">
+                                            <p:txEl>
+                                              <p:pRg st="0" end="0"/>
+                                            </p:txEl>
+                                          </p:spTgt>
+                                        </p:tgtEl>
+                                        <p:attrNameLst>
+                                          <p:attrName>style.visibility</p:attrName>
+                                        </p:attrNameLst>
+                                      </p:cBhvr>
+                                      <p:to>
+                                        <p:strVal val="visible"/>
+                                      </p:to>
+                                    </p:set>
+                                    <p:animEffect transition="in" filter="fade">
+                                      <p:cBhvr>
+                                        <p:cTn id="7" dur="500"/>
+                                        <p:tgtEl>
+                                          <p:spTgt spid="5">
+                                            <p:txEl>
+                                              <p:pRg st="0" end="0"/>
+                                            </p:txEl>
+                                          </p:spTgt>
+                                        </p:tgtEl>
+                                      </p:cBhvr>
+                                    </p:animEffect>
+                                  </p:childTnLst>
+                                </p:cTn>
+                              </p:par>
+                            </p:childTnLst>
+                          </p:cTn>
+                        </p:par>
+                      </p:childTnLst>
+                    </p:cTn>
+                  </p:par>
+                  <p:par>
+                    <p:cTn id="8" fill="hold">
+                      <p:stCondLst>
+                        <p:cond delay="indefinite"/>
+                      </p:stCondLst>
+                      <p:childTnLst>
+                        <p:par>
+                          <p:cTn id="9" fill="hold">
+                            <p:stCondLst>
+                              <p:cond delay="0"/>
+                            </p:stCondLst>
+                            <p:childTnLst>
+                              <p:par>
+                                <p:cTn id="10" presetID="10" presetClass="entr" presetSubtype="0" fill="hold" grpId="0" nodeType="clickEffect">
+                                  <p:stCondLst>
+                                    <p:cond delay="0"/>
+                                  </p:stCondLst>
+                                  <p:childTnLst>
+                                    <p:set>
+                                      <p:cBhvr>
+                                        <p:cTn id="11" dur="1" fill="hold">
+                                          <p:stCondLst>
+                                            <p:cond delay="0"/>
+                                          </p:stCondLst>
+                                        </p:cTn>
+                                        <p:tgtEl>
+                                          <p:spTgt spid="5">
+                                            <p:txEl>
+                                              <p:pRg st="1" end="1"/>
+                                            </p:txEl>
+                                          </p:spTgt>
+                                        </p:tgtEl>
+                                        <p:attrNameLst>
+                                          <p:attrName>style.visibility</p:attrName>
+                                        </p:attrNameLst>
+                                      </p:cBhvr>
+                                      <p:to>
+                                        <p:strVal val="visible"/>
+                                      </p:to>
+                                    </p:set>
+                                    <p:animEffect transition="in" filter="fade">
+                                      <p:cBhvr>
+                                        <p:cTn id="12" dur="500"/>
+                                        <p:tgtEl>
+                                          <p:spTgt spid="5">
+                                            <p:txEl>
+                                              <p:pRg st="1" end="1"/>
+                                            </p:txEl>
+                                          </p:spTgt>
+                                        </p:tgtEl>
+                                      </p:cBhvr>
+                                    </p:animEffect>
+                                  </p:childTnLst>
+                                </p:cTn>
+                              </p:par>
+                            </p:childTnLst>
+                          </p:cTn>
+                        </p:par>
+                      </p:childTnLst>
+                    </p:cTn>
+                  </p:par>
+                  <p:par>
+                    <p:cTn id="13" fill="hold">
+                      <p:stCondLst>
+                        <p:cond delay="indefinite"/>
+                      </p:stCondLst>
+                      <p:childTnLst>
+                        <p:par>
+                          <p:cTn id="14" fill="hold">
+                            <p:stCondLst>
+                              <p:cond delay="0"/>
+                            </p:stCondLst>
+                            <p:childTnLst>
+                              <p:par>
+                                <p:cTn id="15" presetID="10" presetClass="entr" presetSubtype="0" fill="hold" grpId="0" nodeType="clickEffect">
+                                  <p:stCondLst>
+                                    <p:cond delay="0"/>
+                                  </p:stCondLst>
+                                  <p:childTnLst>
+                                    <p:set>
+                                      <p:cBhvr>
+                                        <p:cTn id="16" dur="1" fill="hold">
+                                          <p:stCondLst>
+                                            <p:cond delay="0"/>
+                                          </p:stCondLst>
+                                        </p:cTn>
+                                        <p:tgtEl>
+                                          <p:spTgt spid="5">
+                                            <p:txEl>
+                                              <p:pRg st="2" end="2"/>
+                                            </p:txEl>
+                                          </p:spTgt>
+                                        </p:tgtEl>
+                                        <p:attrNameLst>
+                                          <p:attrName>style.visibility</p:attrName>
+                                        </p:attrNameLst>
+                                      </p:cBhvr>
+                                      <p:to>
+                                        <p:strVal val="visible"/>
+                                      </p:to>
+                                    </p:set>
+                                    <p:animEffect transition="in" filter="fade">
+                                      <p:cBhvr>
+                                        <p:cTn id="17" dur="500"/>
+                                        <p:tgtEl>
+                                          <p:spTgt spid="5">
+                                            <p:txEl>
+                                              <p:pRg st="2" end="2"/>
+                                            </p:txEl>
+                                          </p:spTgt>
+                                        </p:tgtEl>
+                                      </p:cBhvr>
+                                    </p:animEffect>
+                                  </p:childTnLst>
+                                </p:cTn>
+                              </p:par>
+                            </p:childTnLst>
+                          </p:cTn>
+                        </p:par>
+                      </p:childTnLst>
+                    </p:cTn>
+                  </p:par>
+                  <p:par>
+                    <p:cTn id="18" fill="hold">
+                      <p:stCondLst>
+                        <p:cond delay="indefinite"/>
+                      </p:stCondLst>
+                      <p:childTnLst>
+                        <p:par>
+                          <p:cTn id="19" fill="hold">
+                            <p:stCondLst>
+                              <p:cond delay="0"/>
+                            </p:stCondLst>
+                            <p:childTnLst>
+                              <p:par>
+                                <p:cTn id="20" presetID="10" presetClass="entr" presetSubtype="0" fill="hold" grpId="0" nodeType="clickEffect">
+                                  <p:stCondLst>
+                                    <p:cond delay="0"/>
+                                  </p:stCondLst>
+                                  <p:childTnLst>
+                                    <p:set>
+                                      <p:cBhvr>
+                                        <p:cTn id="21" dur="1" fill="hold">
+                                          <p:stCondLst>
+                                            <p:cond delay="0"/>
+                                          </p:stCondLst>
+                                        </p:cTn>
+                                        <p:tgtEl>
+                                          <p:spTgt spid="5">
+                                            <p:txEl>
+                                              <p:pRg st="3" end="3"/>
+                                            </p:txEl>
+                                          </p:spTgt>
+                                        </p:tgtEl>
+                                        <p:attrNameLst>
+                                          <p:attrName>style.visibility</p:attrName>
+                                        </p:attrNameLst>
+                                      </p:cBhvr>
+                                      <p:to>
+                                        <p:strVal val="visible"/>
+                                      </p:to>
+                                    </p:set>
+                                    <p:animEffect transition="in" filter="fade">
+                                      <p:cBhvr>
+                                        <p:cTn id="22" dur="500"/>
+                                        <p:tgtEl>
+                                          <p:spTgt spid="5">
+                                            <p:txEl>
+                                              <p:pRg st="3" end="3"/>
+                                            </p:txEl>
+                                          </p:spTgt>
+                                        </p:tgtEl>
+                                      </p:cBhvr>
+                                    </p:animEffect>
+                                  </p:childTnLst>
+                                </p:cTn>
+                              </p:par>
+                            </p:childTnLst>
+                          </p:cTn>
+                        </p:par>
+                      </p:childTnLst>
+                    </p:cTn>
+                  </p:par>
+                  <p:par>
+                    <p:cTn id="23" fill="hold">
+                      <p:stCondLst>
+                        <p:cond delay="indefinite"/>
+                      </p:stCondLst>
+                      <p:childTnLst>
+                        <p:par>
+                          <p:cTn id="24" fill="hold">
+                            <p:stCondLst>
+                              <p:cond delay="0"/>
+                            </p:stCondLst>
+                            <p:childTnLst>
+                              <p:par>
+                                <p:cTn id="25" presetID="10" presetClass="entr" presetSubtype="0" fill="hold" grpId="0" nodeType="clickEffect">
+                                  <p:stCondLst>
+                                    <p:cond delay="0"/>
+                                  </p:stCondLst>
+                                  <p:childTnLst>
+                                    <p:set>
+                                      <p:cBhvr>
+                                        <p:cTn id="26" dur="1" fill="hold">
+                                          <p:stCondLst>
+                                            <p:cond delay="0"/>
+                                          </p:stCondLst>
+                                        </p:cTn>
+                                        <p:tgtEl>
+                                          <p:spTgt spid="5">
+                                            <p:txEl>
+                                              <p:pRg st="4" end="4"/>
+                                            </p:txEl>
+                                          </p:spTgt>
+                                        </p:tgtEl>
+                                        <p:attrNameLst>
+                                          <p:attrName>style.visibility</p:attrName>
+                                        </p:attrNameLst>
+                                      </p:cBhvr>
+                                      <p:to>
+                                        <p:strVal val="visible"/>
+                                      </p:to>
+                                    </p:set>
+                                    <p:animEffect transition="in" filter="fade">
+                                      <p:cBhvr>
+                                        <p:cTn id="27" dur="500"/>
+                                        <p:tgtEl>
+                                          <p:spTgt spid="5">
+                                            <p:txEl>
+                                              <p:pRg st="4" end="4"/>
+                                            </p:txEl>
+                                          </p:spTgt>
+                                        </p:tgtEl>
+                                      </p:cBhvr>
+                                    </p:animEffect>
+                                  </p:childTnLst>
+                                </p:cTn>
+                              </p:par>
+                            </p:childTnLst>
+                          </p:cTn>
+                        </p:par>
+                      </p:childTnLst>
+                    </p:cTn>
+                  </p:par>
+                  <p:par>
+                    <p:cTn id="28" fill="hold">
+                      <p:stCondLst>
+                        <p:cond delay="indefinite"/>
+                      </p:stCondLst>
+                      <p:childTnLst>
+                        <p:par>
+                          <p:cTn id="29" fill="hold">
+                            <p:stCondLst>
+                              <p:cond delay="0"/>
+                            </p:stCondLst>
+                            <p:childTnLst>
+                              <p:par>
+                                <p:cTn id="30" presetID="10" presetClass="entr" presetSubtype="0" fill="hold" grpId="0" nodeType="clickEffect">
+                                  <p:stCondLst>
+                                    <p:cond delay="0"/>
+                                  </p:stCondLst>
+                                  <p:childTnLst>
+                                    <p:set>
+                                      <p:cBhvr>
+                                        <p:cTn id="31" dur="1" fill="hold">
+                                          <p:stCondLst>
+                                            <p:cond delay="0"/>
+                                          </p:stCondLst>
+                                        </p:cTn>
+                                        <p:tgtEl>
+                                          <p:spTgt spid="5">
+                                            <p:txEl>
+                                              <p:pRg st="5" end="5"/>
+                                            </p:txEl>
+                                          </p:spTgt>
+                                        </p:tgtEl>
+                                        <p:attrNameLst>
+                                          <p:attrName>style.visibility</p:attrName>
+                                        </p:attrNameLst>
+                                      </p:cBhvr>
+                                      <p:to>
+                                        <p:strVal val="visible"/>
+                                      </p:to>
+                                    </p:set>
+                                    <p:animEffect transition="in" filter="fade">
+                                      <p:cBhvr>
+                                        <p:cTn id="32" dur="500"/>
+                                        <p:tgtEl>
+                                          <p:spTgt spid="5">
+                                            <p:txEl>
+                                              <p:pRg st="5" end="5"/>
+                                            </p:txEl>
+                                          </p:spTgt>
+                                        </p:tgtEl>
+                                      </p:cBhvr>
+                                    </p:animEffect>
+                                  </p:childTnLst>
+                                </p:cTn>
+                              </p:par>
+                            </p:childTnLst>
+                          </p:cTn>
+                        </p:par>
+                      </p:childTnLst>
+                    </p:cTn>
+                  </p:par>
+                </p:childTnLst>
+              </p:cTn>
+              <p:prevCondLst>
+                <p:cond evt="onPrev" delay="0">
+                  <p:tgtEl>
+                    <p:sldTgt/>
+                  </p:tgtEl>
+                </p:cond>
+              </p:prevCondLst>
+              <p:nextCondLst>
+                <p:cond evt="onNext" delay="0">
+                  <p:tgtEl>
+                    <p:sldTgt/>
+                  </p:tgtEl>
+                </p:cond>
+              </p:nextCondLst>
+            </p:seq>
+          </p:childTnLst>
+        </p:cTn>
       </p:par>
     </p:tnLst>
+    <p:bldLst>
+      <p:bldP spid="5" grpId="0" build="p"/>
+    </p:bldLst>
   </p:timing>
 </p:sld>
 </file>
 
-<file path=ppt/slides/slide7.xml><?xml version="1.0" encoding="utf-8"?>
+<file path=ppt/slides/slide8.xml><?xml version="1.0" encoding="utf-8"?>
 <p:sld xmlns:a="http://schemas.openxmlformats.org/drawingml/2006/main" xmlns:r="http://schemas.openxmlformats.org/officeDocument/2006/relationships" xmlns:p="http://schemas.openxmlformats.org/presentationml/2006/main">
   <p:cSld>
     <p:spTree>
@@ -7070,7 +9480,13 @@
               <a:rPr lang="en-US" dirty="0" smtClean="0">
                 <a:latin typeface="High Tower Text" panose="02040502050506030303" pitchFamily="18" charset="0"/>
               </a:rPr>
-              <a:t>, Lifetime, etc.</a:t>
+              <a:t>, Mission </a:t>
+            </a:r>
+            <a:r>
+              <a:rPr lang="en-US" dirty="0" smtClean="0">
+                <a:latin typeface="High Tower Text" panose="02040502050506030303" pitchFamily="18" charset="0"/>
+              </a:rPr>
+              <a:t>Lifetime, etc.</a:t>
             </a:r>
           </a:p>
           <a:p>
@@ -7142,14 +9558,327 @@
   <p:timing>
     <p:tnLst>
       <p:par>
-        <p:cTn id="1" dur="indefinite" restart="never" nodeType="tmRoot"/>
+        <p:cTn id="1" dur="indefinite" restart="never" nodeType="tmRoot">
+          <p:childTnLst>
+            <p:seq concurrent="1" nextAc="seek">
+              <p:cTn id="2" dur="indefinite" nodeType="mainSeq">
+                <p:childTnLst>
+                  <p:par>
+                    <p:cTn id="3" fill="hold">
+                      <p:stCondLst>
+                        <p:cond delay="indefinite"/>
+                      </p:stCondLst>
+                      <p:childTnLst>
+                        <p:par>
+                          <p:cTn id="4" fill="hold">
+                            <p:stCondLst>
+                              <p:cond delay="0"/>
+                            </p:stCondLst>
+                            <p:childTnLst>
+                              <p:par>
+                                <p:cTn id="5" presetID="10" presetClass="entr" presetSubtype="0" fill="hold" grpId="0" nodeType="clickEffect">
+                                  <p:stCondLst>
+                                    <p:cond delay="0"/>
+                                  </p:stCondLst>
+                                  <p:childTnLst>
+                                    <p:set>
+                                      <p:cBhvr>
+                                        <p:cTn id="6" dur="1" fill="hold">
+                                          <p:stCondLst>
+                                            <p:cond delay="0"/>
+                                          </p:stCondLst>
+                                        </p:cTn>
+                                        <p:tgtEl>
+                                          <p:spTgt spid="4">
+                                            <p:txEl>
+                                              <p:pRg st="0" end="0"/>
+                                            </p:txEl>
+                                          </p:spTgt>
+                                        </p:tgtEl>
+                                        <p:attrNameLst>
+                                          <p:attrName>style.visibility</p:attrName>
+                                        </p:attrNameLst>
+                                      </p:cBhvr>
+                                      <p:to>
+                                        <p:strVal val="visible"/>
+                                      </p:to>
+                                    </p:set>
+                                    <p:animEffect transition="in" filter="fade">
+                                      <p:cBhvr>
+                                        <p:cTn id="7" dur="500"/>
+                                        <p:tgtEl>
+                                          <p:spTgt spid="4">
+                                            <p:txEl>
+                                              <p:pRg st="0" end="0"/>
+                                            </p:txEl>
+                                          </p:spTgt>
+                                        </p:tgtEl>
+                                      </p:cBhvr>
+                                    </p:animEffect>
+                                  </p:childTnLst>
+                                </p:cTn>
+                              </p:par>
+                              <p:par>
+                                <p:cTn id="8" presetID="10" presetClass="entr" presetSubtype="0" fill="hold" grpId="0" nodeType="withEffect">
+                                  <p:stCondLst>
+                                    <p:cond delay="0"/>
+                                  </p:stCondLst>
+                                  <p:childTnLst>
+                                    <p:set>
+                                      <p:cBhvr>
+                                        <p:cTn id="9" dur="1" fill="hold">
+                                          <p:stCondLst>
+                                            <p:cond delay="0"/>
+                                          </p:stCondLst>
+                                        </p:cTn>
+                                        <p:tgtEl>
+                                          <p:spTgt spid="4">
+                                            <p:txEl>
+                                              <p:pRg st="1" end="1"/>
+                                            </p:txEl>
+                                          </p:spTgt>
+                                        </p:tgtEl>
+                                        <p:attrNameLst>
+                                          <p:attrName>style.visibility</p:attrName>
+                                        </p:attrNameLst>
+                                      </p:cBhvr>
+                                      <p:to>
+                                        <p:strVal val="visible"/>
+                                      </p:to>
+                                    </p:set>
+                                    <p:animEffect transition="in" filter="fade">
+                                      <p:cBhvr>
+                                        <p:cTn id="10" dur="500"/>
+                                        <p:tgtEl>
+                                          <p:spTgt spid="4">
+                                            <p:txEl>
+                                              <p:pRg st="1" end="1"/>
+                                            </p:txEl>
+                                          </p:spTgt>
+                                        </p:tgtEl>
+                                      </p:cBhvr>
+                                    </p:animEffect>
+                                  </p:childTnLst>
+                                </p:cTn>
+                              </p:par>
+                            </p:childTnLst>
+                          </p:cTn>
+                        </p:par>
+                      </p:childTnLst>
+                    </p:cTn>
+                  </p:par>
+                  <p:par>
+                    <p:cTn id="11" fill="hold">
+                      <p:stCondLst>
+                        <p:cond delay="indefinite"/>
+                      </p:stCondLst>
+                      <p:childTnLst>
+                        <p:par>
+                          <p:cTn id="12" fill="hold">
+                            <p:stCondLst>
+                              <p:cond delay="0"/>
+                            </p:stCondLst>
+                            <p:childTnLst>
+                              <p:par>
+                                <p:cTn id="13" presetID="10" presetClass="entr" presetSubtype="0" fill="hold" grpId="0" nodeType="clickEffect">
+                                  <p:stCondLst>
+                                    <p:cond delay="0"/>
+                                  </p:stCondLst>
+                                  <p:childTnLst>
+                                    <p:set>
+                                      <p:cBhvr>
+                                        <p:cTn id="14" dur="1" fill="hold">
+                                          <p:stCondLst>
+                                            <p:cond delay="0"/>
+                                          </p:stCondLst>
+                                        </p:cTn>
+                                        <p:tgtEl>
+                                          <p:spTgt spid="4">
+                                            <p:txEl>
+                                              <p:pRg st="2" end="2"/>
+                                            </p:txEl>
+                                          </p:spTgt>
+                                        </p:tgtEl>
+                                        <p:attrNameLst>
+                                          <p:attrName>style.visibility</p:attrName>
+                                        </p:attrNameLst>
+                                      </p:cBhvr>
+                                      <p:to>
+                                        <p:strVal val="visible"/>
+                                      </p:to>
+                                    </p:set>
+                                    <p:animEffect transition="in" filter="fade">
+                                      <p:cBhvr>
+                                        <p:cTn id="15" dur="500"/>
+                                        <p:tgtEl>
+                                          <p:spTgt spid="4">
+                                            <p:txEl>
+                                              <p:pRg st="2" end="2"/>
+                                            </p:txEl>
+                                          </p:spTgt>
+                                        </p:tgtEl>
+                                      </p:cBhvr>
+                                    </p:animEffect>
+                                  </p:childTnLst>
+                                </p:cTn>
+                              </p:par>
+                            </p:childTnLst>
+                          </p:cTn>
+                        </p:par>
+                      </p:childTnLst>
+                    </p:cTn>
+                  </p:par>
+                  <p:par>
+                    <p:cTn id="16" fill="hold">
+                      <p:stCondLst>
+                        <p:cond delay="indefinite"/>
+                      </p:stCondLst>
+                      <p:childTnLst>
+                        <p:par>
+                          <p:cTn id="17" fill="hold">
+                            <p:stCondLst>
+                              <p:cond delay="0"/>
+                            </p:stCondLst>
+                            <p:childTnLst>
+                              <p:par>
+                                <p:cTn id="18" presetID="10" presetClass="entr" presetSubtype="0" fill="hold" grpId="0" nodeType="clickEffect">
+                                  <p:stCondLst>
+                                    <p:cond delay="0"/>
+                                  </p:stCondLst>
+                                  <p:childTnLst>
+                                    <p:set>
+                                      <p:cBhvr>
+                                        <p:cTn id="19" dur="1" fill="hold">
+                                          <p:stCondLst>
+                                            <p:cond delay="0"/>
+                                          </p:stCondLst>
+                                        </p:cTn>
+                                        <p:tgtEl>
+                                          <p:spTgt spid="4">
+                                            <p:txEl>
+                                              <p:pRg st="3" end="3"/>
+                                            </p:txEl>
+                                          </p:spTgt>
+                                        </p:tgtEl>
+                                        <p:attrNameLst>
+                                          <p:attrName>style.visibility</p:attrName>
+                                        </p:attrNameLst>
+                                      </p:cBhvr>
+                                      <p:to>
+                                        <p:strVal val="visible"/>
+                                      </p:to>
+                                    </p:set>
+                                    <p:animEffect transition="in" filter="fade">
+                                      <p:cBhvr>
+                                        <p:cTn id="20" dur="500"/>
+                                        <p:tgtEl>
+                                          <p:spTgt spid="4">
+                                            <p:txEl>
+                                              <p:pRg st="3" end="3"/>
+                                            </p:txEl>
+                                          </p:spTgt>
+                                        </p:tgtEl>
+                                      </p:cBhvr>
+                                    </p:animEffect>
+                                  </p:childTnLst>
+                                </p:cTn>
+                              </p:par>
+                            </p:childTnLst>
+                          </p:cTn>
+                        </p:par>
+                      </p:childTnLst>
+                    </p:cTn>
+                  </p:par>
+                  <p:par>
+                    <p:cTn id="21" fill="hold">
+                      <p:stCondLst>
+                        <p:cond delay="indefinite"/>
+                      </p:stCondLst>
+                      <p:childTnLst>
+                        <p:par>
+                          <p:cTn id="22" fill="hold">
+                            <p:stCondLst>
+                              <p:cond delay="0"/>
+                            </p:stCondLst>
+                            <p:childTnLst>
+                              <p:par>
+                                <p:cTn id="23" presetID="10" presetClass="entr" presetSubtype="0" fill="hold" grpId="0" nodeType="clickEffect">
+                                  <p:stCondLst>
+                                    <p:cond delay="0"/>
+                                  </p:stCondLst>
+                                  <p:childTnLst>
+                                    <p:set>
+                                      <p:cBhvr>
+                                        <p:cTn id="24" dur="1" fill="hold">
+                                          <p:stCondLst>
+                                            <p:cond delay="0"/>
+                                          </p:stCondLst>
+                                        </p:cTn>
+                                        <p:tgtEl>
+                                          <p:spTgt spid="4">
+                                            <p:txEl>
+                                              <p:pRg st="4" end="4"/>
+                                            </p:txEl>
+                                          </p:spTgt>
+                                        </p:tgtEl>
+                                        <p:attrNameLst>
+                                          <p:attrName>style.visibility</p:attrName>
+                                        </p:attrNameLst>
+                                      </p:cBhvr>
+                                      <p:to>
+                                        <p:strVal val="visible"/>
+                                      </p:to>
+                                    </p:set>
+                                    <p:animEffect transition="in" filter="fade">
+                                      <p:cBhvr>
+                                        <p:cTn id="25" dur="500"/>
+                                        <p:tgtEl>
+                                          <p:spTgt spid="4">
+                                            <p:txEl>
+                                              <p:pRg st="4" end="4"/>
+                                            </p:txEl>
+                                          </p:spTgt>
+                                        </p:tgtEl>
+                                      </p:cBhvr>
+                                    </p:animEffect>
+                                  </p:childTnLst>
+                                </p:cTn>
+                              </p:par>
+                            </p:childTnLst>
+                          </p:cTn>
+                        </p:par>
+                      </p:childTnLst>
+                    </p:cTn>
+                  </p:par>
+                </p:childTnLst>
+              </p:cTn>
+              <p:prevCondLst>
+                <p:cond evt="onPrev" delay="0">
+                  <p:tgtEl>
+                    <p:sldTgt/>
+                  </p:tgtEl>
+                </p:cond>
+              </p:prevCondLst>
+              <p:nextCondLst>
+                <p:cond evt="onNext" delay="0">
+                  <p:tgtEl>
+                    <p:sldTgt/>
+                  </p:tgtEl>
+                </p:cond>
+              </p:nextCondLst>
+            </p:seq>
+          </p:childTnLst>
+        </p:cTn>
       </p:par>
     </p:tnLst>
+    <p:bldLst>
+      <p:bldP spid="4" grpId="0" build="p"/>
+    </p:bldLst>
   </p:timing>
 </p:sld>
 </file>
 
-<file path=ppt/slides/slide8.xml><?xml version="1.0" encoding="utf-8"?>
+<file path=ppt/slides/slide9.xml><?xml version="1.0" encoding="utf-8"?>
 <p:sld xmlns:a="http://schemas.openxmlformats.org/drawingml/2006/main" xmlns:r="http://schemas.openxmlformats.org/officeDocument/2006/relationships" xmlns:p="http://schemas.openxmlformats.org/presentationml/2006/main">
   <p:cSld>
     <p:spTree>
@@ -7579,157 +10308,279 @@
   <p:timing>
     <p:tnLst>
       <p:par>
-        <p:cTn id="1" dur="indefinite" restart="never" nodeType="tmRoot"/>
+        <p:cTn id="1" dur="indefinite" restart="never" nodeType="tmRoot">
+          <p:childTnLst>
+            <p:seq concurrent="1" nextAc="seek">
+              <p:cTn id="2" dur="indefinite" nodeType="mainSeq">
+                <p:childTnLst>
+                  <p:par>
+                    <p:cTn id="3" fill="hold">
+                      <p:stCondLst>
+                        <p:cond delay="indefinite"/>
+                      </p:stCondLst>
+                      <p:childTnLst>
+                        <p:par>
+                          <p:cTn id="4" fill="hold">
+                            <p:stCondLst>
+                              <p:cond delay="0"/>
+                            </p:stCondLst>
+                            <p:childTnLst>
+                              <p:par>
+                                <p:cTn id="5" presetID="10" presetClass="entr" presetSubtype="0" fill="hold" grpId="0" nodeType="clickEffect">
+                                  <p:stCondLst>
+                                    <p:cond delay="0"/>
+                                  </p:stCondLst>
+                                  <p:childTnLst>
+                                    <p:set>
+                                      <p:cBhvr>
+                                        <p:cTn id="6" dur="1" fill="hold">
+                                          <p:stCondLst>
+                                            <p:cond delay="0"/>
+                                          </p:stCondLst>
+                                        </p:cTn>
+                                        <p:tgtEl>
+                                          <p:spTgt spid="7">
+                                            <p:txEl>
+                                              <p:pRg st="0" end="0"/>
+                                            </p:txEl>
+                                          </p:spTgt>
+                                        </p:tgtEl>
+                                        <p:attrNameLst>
+                                          <p:attrName>style.visibility</p:attrName>
+                                        </p:attrNameLst>
+                                      </p:cBhvr>
+                                      <p:to>
+                                        <p:strVal val="visible"/>
+                                      </p:to>
+                                    </p:set>
+                                    <p:animEffect transition="in" filter="fade">
+                                      <p:cBhvr>
+                                        <p:cTn id="7" dur="500"/>
+                                        <p:tgtEl>
+                                          <p:spTgt spid="7">
+                                            <p:txEl>
+                                              <p:pRg st="0" end="0"/>
+                                            </p:txEl>
+                                          </p:spTgt>
+                                        </p:tgtEl>
+                                      </p:cBhvr>
+                                    </p:animEffect>
+                                  </p:childTnLst>
+                                </p:cTn>
+                              </p:par>
+                            </p:childTnLst>
+                          </p:cTn>
+                        </p:par>
+                      </p:childTnLst>
+                    </p:cTn>
+                  </p:par>
+                  <p:par>
+                    <p:cTn id="8" fill="hold">
+                      <p:stCondLst>
+                        <p:cond delay="indefinite"/>
+                      </p:stCondLst>
+                      <p:childTnLst>
+                        <p:par>
+                          <p:cTn id="9" fill="hold">
+                            <p:stCondLst>
+                              <p:cond delay="0"/>
+                            </p:stCondLst>
+                            <p:childTnLst>
+                              <p:par>
+                                <p:cTn id="10" presetID="10" presetClass="entr" presetSubtype="0" fill="hold" grpId="0" nodeType="clickEffect">
+                                  <p:stCondLst>
+                                    <p:cond delay="0"/>
+                                  </p:stCondLst>
+                                  <p:childTnLst>
+                                    <p:set>
+                                      <p:cBhvr>
+                                        <p:cTn id="11" dur="1" fill="hold">
+                                          <p:stCondLst>
+                                            <p:cond delay="0"/>
+                                          </p:stCondLst>
+                                        </p:cTn>
+                                        <p:tgtEl>
+                                          <p:spTgt spid="7">
+                                            <p:txEl>
+                                              <p:pRg st="1" end="1"/>
+                                            </p:txEl>
+                                          </p:spTgt>
+                                        </p:tgtEl>
+                                        <p:attrNameLst>
+                                          <p:attrName>style.visibility</p:attrName>
+                                        </p:attrNameLst>
+                                      </p:cBhvr>
+                                      <p:to>
+                                        <p:strVal val="visible"/>
+                                      </p:to>
+                                    </p:set>
+                                    <p:animEffect transition="in" filter="fade">
+                                      <p:cBhvr>
+                                        <p:cTn id="12" dur="500"/>
+                                        <p:tgtEl>
+                                          <p:spTgt spid="7">
+                                            <p:txEl>
+                                              <p:pRg st="1" end="1"/>
+                                            </p:txEl>
+                                          </p:spTgt>
+                                        </p:tgtEl>
+                                      </p:cBhvr>
+                                    </p:animEffect>
+                                  </p:childTnLst>
+                                </p:cTn>
+                              </p:par>
+                            </p:childTnLst>
+                          </p:cTn>
+                        </p:par>
+                      </p:childTnLst>
+                    </p:cTn>
+                  </p:par>
+                  <p:par>
+                    <p:cTn id="13" fill="hold">
+                      <p:stCondLst>
+                        <p:cond delay="indefinite"/>
+                      </p:stCondLst>
+                      <p:childTnLst>
+                        <p:par>
+                          <p:cTn id="14" fill="hold">
+                            <p:stCondLst>
+                              <p:cond delay="0"/>
+                            </p:stCondLst>
+                            <p:childTnLst>
+                              <p:par>
+                                <p:cTn id="15" presetID="10" presetClass="entr" presetSubtype="0" fill="hold" grpId="0" nodeType="clickEffect">
+                                  <p:stCondLst>
+                                    <p:cond delay="0"/>
+                                  </p:stCondLst>
+                                  <p:childTnLst>
+                                    <p:set>
+                                      <p:cBhvr>
+                                        <p:cTn id="16" dur="1" fill="hold">
+                                          <p:stCondLst>
+                                            <p:cond delay="0"/>
+                                          </p:stCondLst>
+                                        </p:cTn>
+                                        <p:tgtEl>
+                                          <p:spTgt spid="7">
+                                            <p:txEl>
+                                              <p:pRg st="3" end="3"/>
+                                            </p:txEl>
+                                          </p:spTgt>
+                                        </p:tgtEl>
+                                        <p:attrNameLst>
+                                          <p:attrName>style.visibility</p:attrName>
+                                        </p:attrNameLst>
+                                      </p:cBhvr>
+                                      <p:to>
+                                        <p:strVal val="visible"/>
+                                      </p:to>
+                                    </p:set>
+                                    <p:animEffect transition="in" filter="fade">
+                                      <p:cBhvr>
+                                        <p:cTn id="17" dur="500"/>
+                                        <p:tgtEl>
+                                          <p:spTgt spid="7">
+                                            <p:txEl>
+                                              <p:pRg st="3" end="3"/>
+                                            </p:txEl>
+                                          </p:spTgt>
+                                        </p:tgtEl>
+                                      </p:cBhvr>
+                                    </p:animEffect>
+                                  </p:childTnLst>
+                                </p:cTn>
+                              </p:par>
+                            </p:childTnLst>
+                          </p:cTn>
+                        </p:par>
+                      </p:childTnLst>
+                    </p:cTn>
+                  </p:par>
+                  <p:par>
+                    <p:cTn id="18" fill="hold">
+                      <p:stCondLst>
+                        <p:cond delay="indefinite"/>
+                      </p:stCondLst>
+                      <p:childTnLst>
+                        <p:par>
+                          <p:cTn id="19" fill="hold">
+                            <p:stCondLst>
+                              <p:cond delay="0"/>
+                            </p:stCondLst>
+                            <p:childTnLst>
+                              <p:par>
+                                <p:cTn id="20" presetID="10" presetClass="entr" presetSubtype="0" fill="hold" grpId="0" nodeType="clickEffect">
+                                  <p:stCondLst>
+                                    <p:cond delay="0"/>
+                                  </p:stCondLst>
+                                  <p:childTnLst>
+                                    <p:set>
+                                      <p:cBhvr>
+                                        <p:cTn id="21" dur="1" fill="hold">
+                                          <p:stCondLst>
+                                            <p:cond delay="0"/>
+                                          </p:stCondLst>
+                                        </p:cTn>
+                                        <p:tgtEl>
+                                          <p:spTgt spid="7">
+                                            <p:txEl>
+                                              <p:pRg st="4" end="4"/>
+                                            </p:txEl>
+                                          </p:spTgt>
+                                        </p:tgtEl>
+                                        <p:attrNameLst>
+                                          <p:attrName>style.visibility</p:attrName>
+                                        </p:attrNameLst>
+                                      </p:cBhvr>
+                                      <p:to>
+                                        <p:strVal val="visible"/>
+                                      </p:to>
+                                    </p:set>
+                                    <p:animEffect transition="in" filter="fade">
+                                      <p:cBhvr>
+                                        <p:cTn id="22" dur="500"/>
+                                        <p:tgtEl>
+                                          <p:spTgt spid="7">
+                                            <p:txEl>
+                                              <p:pRg st="4" end="4"/>
+                                            </p:txEl>
+                                          </p:spTgt>
+                                        </p:tgtEl>
+                                      </p:cBhvr>
+                                    </p:animEffect>
+                                  </p:childTnLst>
+                                </p:cTn>
+                              </p:par>
+                            </p:childTnLst>
+                          </p:cTn>
+                        </p:par>
+                      </p:childTnLst>
+                    </p:cTn>
+                  </p:par>
+                </p:childTnLst>
+              </p:cTn>
+              <p:prevCondLst>
+                <p:cond evt="onPrev" delay="0">
+                  <p:tgtEl>
+                    <p:sldTgt/>
+                  </p:tgtEl>
+                </p:cond>
+              </p:prevCondLst>
+              <p:nextCondLst>
+                <p:cond evt="onNext" delay="0">
+                  <p:tgtEl>
+                    <p:sldTgt/>
+                  </p:tgtEl>
+                </p:cond>
+              </p:nextCondLst>
+            </p:seq>
+          </p:childTnLst>
+        </p:cTn>
       </p:par>
     </p:tnLst>
-  </p:timing>
-</p:sld>
-</file>
-
-<file path=ppt/slides/slide9.xml><?xml version="1.0" encoding="utf-8"?>
-<p:sld xmlns:a="http://schemas.openxmlformats.org/drawingml/2006/main" xmlns:r="http://schemas.openxmlformats.org/officeDocument/2006/relationships" xmlns:p="http://schemas.openxmlformats.org/presentationml/2006/main">
-  <p:cSld>
-    <p:spTree>
-      <p:nvGrpSpPr>
-        <p:cNvPr id="1" name=""/>
-        <p:cNvGrpSpPr/>
-        <p:nvPr/>
-      </p:nvGrpSpPr>
-      <p:grpSpPr>
-        <a:xfrm>
-          <a:off x="0" y="0"/>
-          <a:ext cx="0" cy="0"/>
-          <a:chOff x="0" y="0"/>
-          <a:chExt cx="0" cy="0"/>
-        </a:xfrm>
-      </p:grpSpPr>
-      <p:sp>
-        <p:nvSpPr>
-          <p:cNvPr id="2" name="Title 1"/>
-          <p:cNvSpPr>
-            <a:spLocks noGrp="1"/>
-          </p:cNvSpPr>
-          <p:nvPr>
-            <p:ph type="title"/>
-          </p:nvPr>
-        </p:nvSpPr>
-        <p:spPr/>
-        <p:txBody>
-          <a:bodyPr/>
-          <a:lstStyle/>
-          <a:p>
-            <a:r>
-              <a:rPr lang="en-US" dirty="0" smtClean="0">
-                <a:latin typeface="High Tower Text" panose="02040502050506030303" pitchFamily="18" charset="0"/>
-              </a:rPr>
-              <a:t>Expected results</a:t>
-            </a:r>
-            <a:endParaRPr lang="en-US" dirty="0">
-              <a:latin typeface="High Tower Text" panose="02040502050506030303" pitchFamily="18" charset="0"/>
-            </a:endParaRPr>
-          </a:p>
-        </p:txBody>
-      </p:sp>
-      <p:sp>
-        <p:nvSpPr>
-          <p:cNvPr id="3" name="Content Placeholder 2"/>
-          <p:cNvSpPr>
-            <a:spLocks noGrp="1"/>
-          </p:cNvSpPr>
-          <p:nvPr>
-            <p:ph idx="1"/>
-          </p:nvPr>
-        </p:nvSpPr>
-        <p:spPr>
-          <a:xfrm>
-            <a:off x="838200" y="1690688"/>
-            <a:ext cx="10515600" cy="4351338"/>
-          </a:xfrm>
-        </p:spPr>
-        <p:txBody>
-          <a:bodyPr/>
-          <a:lstStyle/>
-          <a:p>
-            <a:r>
-              <a:rPr lang="en-US" dirty="0" smtClean="0">
-                <a:latin typeface="High Tower Text" panose="02040502050506030303" pitchFamily="18" charset="0"/>
-              </a:rPr>
-              <a:t>The network simulation will be tested against a number of approaches to collection and propagation challenges</a:t>
-            </a:r>
-          </a:p>
-          <a:p>
-            <a:r>
-              <a:rPr lang="en-US" dirty="0" smtClean="0">
-                <a:latin typeface="High Tower Text" panose="02040502050506030303" pitchFamily="18" charset="0"/>
-              </a:rPr>
-              <a:t>The research intends to shed light on potential best approaches which maximize certain properties such as:</a:t>
-            </a:r>
-          </a:p>
-          <a:p>
-            <a:pPr lvl="1"/>
-            <a:r>
-              <a:rPr lang="en-US" dirty="0" smtClean="0">
-                <a:latin typeface="High Tower Text" panose="02040502050506030303" pitchFamily="18" charset="0"/>
-              </a:rPr>
-              <a:t>Average CubeSat power availability</a:t>
-            </a:r>
-          </a:p>
-          <a:p>
-            <a:pPr lvl="1"/>
-            <a:r>
-              <a:rPr lang="en-US" dirty="0">
-                <a:latin typeface="High Tower Text" panose="02040502050506030303" pitchFamily="18" charset="0"/>
-              </a:rPr>
-              <a:t>D</a:t>
-            </a:r>
-            <a:r>
-              <a:rPr lang="en-US" dirty="0" smtClean="0">
-                <a:latin typeface="High Tower Text" panose="02040502050506030303" pitchFamily="18" charset="0"/>
-              </a:rPr>
-              <a:t>ata propagation rates</a:t>
-            </a:r>
-          </a:p>
-          <a:p>
-            <a:pPr lvl="1"/>
-            <a:r>
-              <a:rPr lang="en-US" dirty="0" smtClean="0">
-                <a:latin typeface="High Tower Text" panose="02040502050506030303" pitchFamily="18" charset="0"/>
-              </a:rPr>
-              <a:t>Payload data downlink throughput</a:t>
-            </a:r>
-          </a:p>
-          <a:p>
-            <a:pPr marL="0" indent="0">
-              <a:buNone/>
-            </a:pPr>
-            <a:endParaRPr lang="en-US" dirty="0" smtClean="0">
-              <a:latin typeface="High Tower Text" panose="02040502050506030303" pitchFamily="18" charset="0"/>
-            </a:endParaRPr>
-          </a:p>
-          <a:p>
-            <a:pPr lvl="1"/>
-            <a:endParaRPr lang="en-US" dirty="0">
-              <a:latin typeface="High Tower Text" panose="02040502050506030303" pitchFamily="18" charset="0"/>
-            </a:endParaRPr>
-          </a:p>
-        </p:txBody>
-      </p:sp>
-    </p:spTree>
-    <p:extLst>
-      <p:ext uri="{BB962C8B-B14F-4D97-AF65-F5344CB8AC3E}">
-        <p14:creationId xmlns:p14="http://schemas.microsoft.com/office/powerpoint/2010/main" val="2516104629"/>
-      </p:ext>
-    </p:extLst>
-  </p:cSld>
-  <p:clrMapOvr>
-    <a:masterClrMapping/>
-  </p:clrMapOvr>
-  <p:timing>
-    <p:tnLst>
-      <p:par>
-        <p:cTn id="1" dur="indefinite" restart="never" nodeType="tmRoot"/>
-      </p:par>
-    </p:tnLst>
+    <p:bldLst>
+      <p:bldP spid="7" grpId="0" build="p"/>
+    </p:bldLst>
   </p:timing>
 </p:sld>
 </file>

</xml_diff>